<commit_message>
PPT updated with recommendation
</commit_message>
<xml_diff>
--- a/Project1-Final-Files/Presenting_DataGuru.pptx
+++ b/Project1-Final-Files/Presenting_DataGuru.pptx
@@ -5,7 +5,7 @@
     <p:sldMasterId id="2147483684" r:id="rId1"/>
   </p:sldMasterIdLst>
   <p:notesMasterIdLst>
-    <p:notesMasterId r:id="rId16"/>
+    <p:notesMasterId r:id="rId17"/>
   </p:notesMasterIdLst>
   <p:sldIdLst>
     <p:sldId id="256" r:id="rId2"/>
@@ -20,8 +20,9 @@
     <p:sldId id="326" r:id="rId11"/>
     <p:sldId id="312" r:id="rId12"/>
     <p:sldId id="316" r:id="rId13"/>
-    <p:sldId id="322" r:id="rId14"/>
-    <p:sldId id="327" r:id="rId15"/>
+    <p:sldId id="328" r:id="rId14"/>
+    <p:sldId id="322" r:id="rId15"/>
+    <p:sldId id="327" r:id="rId16"/>
   </p:sldIdLst>
   <p:sldSz cx="12192000" cy="6858000"/>
   <p:notesSz cx="6858000" cy="9144000"/>
@@ -3150,7 +3151,7 @@
         <a:lstStyle/>
         <a:p>
           <a:r>
-            <a:rPr lang="en-US" sz="2400" dirty="0">
+            <a:rPr lang="en-US" sz="2400" kern="1200" dirty="0">
               <a:solidFill>
                 <a:schemeClr val="bg1"/>
               </a:solidFill>
@@ -3160,7 +3161,7 @@
         </a:p>
         <a:p>
           <a:r>
-            <a:rPr lang="en-US" sz="2000" dirty="0">
+            <a:rPr lang="en-US" sz="1400" kern="1200" dirty="0">
               <a:solidFill>
                 <a:schemeClr val="bg1"/>
               </a:solidFill>
@@ -3168,7 +3169,7 @@
             <a:t>Marketing &amp; Business Unit heads has </a:t>
           </a:r>
           <a:r>
-            <a:rPr lang="en-US" sz="2000" b="1" dirty="0">
+            <a:rPr lang="en-US" sz="1400" b="1" kern="1200" dirty="0">
               <a:solidFill>
                 <a:srgbClr val="FF0000"/>
               </a:solidFill>
@@ -3176,7 +3177,7 @@
             <a:t>20%</a:t>
           </a:r>
           <a:r>
-            <a:rPr lang="en-US" sz="2000" dirty="0">
+            <a:rPr lang="en-US" sz="1400" kern="1200" dirty="0">
               <a:solidFill>
                 <a:srgbClr val="FF0000"/>
               </a:solidFill>
@@ -3184,7 +3185,7 @@
             <a:t> </a:t>
           </a:r>
           <a:r>
-            <a:rPr lang="en-US" sz="2000" dirty="0">
+            <a:rPr lang="en-US" sz="1400" kern="1200" dirty="0">
               <a:solidFill>
                 <a:schemeClr val="bg1"/>
               </a:solidFill>
@@ -3192,7 +3193,7 @@
             <a:t>conversion expectation. </a:t>
           </a:r>
           <a:r>
-            <a:rPr lang="en-US" sz="2000" dirty="0">
+            <a:rPr lang="en-US" sz="1400" kern="1200" dirty="0">
               <a:solidFill>
                 <a:srgbClr val="FF0000"/>
               </a:solidFill>
@@ -3200,7 +3201,7 @@
             <a:t>(</a:t>
           </a:r>
           <a:r>
-            <a:rPr lang="en-US" sz="2000" b="1" dirty="0">
+            <a:rPr lang="en-US" sz="1400" b="1" kern="1200" dirty="0">
               <a:solidFill>
                 <a:srgbClr val="FF0000"/>
               </a:solidFill>
@@ -3208,12 +3209,25 @@
             <a:t>Translate to 18 customers</a:t>
           </a:r>
           <a:r>
-            <a:rPr lang="en-US" sz="2000" dirty="0">
+            <a:rPr lang="en-US" sz="1400" kern="1200" dirty="0">
               <a:solidFill>
                 <a:srgbClr val="FF0000"/>
               </a:solidFill>
             </a:rPr>
             <a:t>)</a:t>
+          </a:r>
+        </a:p>
+        <a:p>
+          <a:r>
+            <a:rPr lang="en-US" sz="1400" kern="1200" dirty="0">
+              <a:solidFill>
+                <a:prstClr val="black"/>
+              </a:solidFill>
+              <a:latin typeface="Calibri" panose="020F0502020204030204"/>
+              <a:ea typeface="+mn-ea"/>
+              <a:cs typeface="+mn-cs"/>
+            </a:rPr>
+            <a:t>Data Package is more popular out of 3 services</a:t>
           </a:r>
         </a:p>
       </dgm:t>
@@ -3795,7 +3809,7 @@
   <dgm:whole/>
   <dgm:extLst>
     <a:ext uri="http://schemas.microsoft.com/office/drawing/2008/diagram">
-      <dsp:dataModelExt xmlns:dsp="http://schemas.microsoft.com/office/drawing/2008/diagram" relId="rId6" minVer="http://schemas.openxmlformats.org/drawingml/2006/diagram"/>
+      <dsp:dataModelExt xmlns:dsp="http://schemas.microsoft.com/office/drawing/2008/diagram" relId="rId8" minVer="http://schemas.openxmlformats.org/drawingml/2006/diagram"/>
     </a:ext>
   </dgm:extLst>
 </dgm:dataModel>
@@ -4170,7 +4184,29 @@
               <a:ea typeface="+mn-ea"/>
               <a:cs typeface="+mn-cs"/>
             </a:rPr>
-            <a:t>Shape (53906,16)</a:t>
+            <a:t>Shape </a:t>
+          </a:r>
+          <a:r>
+            <a:rPr lang="en-US" sz="1100" kern="1200">
+              <a:solidFill>
+                <a:prstClr val="black"/>
+              </a:solidFill>
+              <a:latin typeface="Calibri" panose="020F0502020204030204"/>
+              <a:ea typeface="+mn-ea"/>
+              <a:cs typeface="+mn-cs"/>
+            </a:rPr>
+            <a:t>(71286,16</a:t>
+          </a:r>
+          <a:r>
+            <a:rPr lang="en-US" sz="1100" kern="1200" dirty="0">
+              <a:solidFill>
+                <a:prstClr val="black"/>
+              </a:solidFill>
+              <a:latin typeface="Calibri" panose="020F0502020204030204"/>
+              <a:ea typeface="+mn-ea"/>
+              <a:cs typeface="+mn-cs"/>
+            </a:rPr>
+            <a:t>)</a:t>
           </a:r>
         </a:p>
         <a:p>
@@ -4648,7 +4684,26 @@
                 <a:schemeClr val="bg1"/>
               </a:solidFill>
             </a:rPr>
-            <a:t>Page Views: 53906 </a:t>
+            <a:t>Page Views: </a:t>
+          </a:r>
+          <a:r>
+            <a:rPr lang="en-US" dirty="0">
+              <a:solidFill>
+                <a:prstClr val="black"/>
+              </a:solidFill>
+              <a:latin typeface="Calibri" panose="020F0502020204030204"/>
+              <a:ea typeface="+mn-ea"/>
+              <a:cs typeface="+mn-cs"/>
+            </a:rPr>
+            <a:t>71286</a:t>
+          </a:r>
+          <a:r>
+            <a:rPr lang="en-US" dirty="0">
+              <a:solidFill>
+                <a:schemeClr val="bg1"/>
+              </a:solidFill>
+            </a:rPr>
+            <a:t> </a:t>
           </a:r>
         </a:p>
       </dgm:t>
@@ -5224,7 +5279,7 @@
             <a:buNone/>
           </a:pPr>
           <a:r>
-            <a:rPr lang="en-US" sz="2000" kern="1200" dirty="0">
+            <a:rPr lang="en-US" sz="1400" kern="1200" dirty="0">
               <a:solidFill>
                 <a:schemeClr val="bg1"/>
               </a:solidFill>
@@ -5232,7 +5287,7 @@
             <a:t>Marketing &amp; Business Unit heads has </a:t>
           </a:r>
           <a:r>
-            <a:rPr lang="en-US" sz="2000" b="1" kern="1200" dirty="0">
+            <a:rPr lang="en-US" sz="1400" b="1" kern="1200" dirty="0">
               <a:solidFill>
                 <a:srgbClr val="FF0000"/>
               </a:solidFill>
@@ -5240,7 +5295,7 @@
             <a:t>20%</a:t>
           </a:r>
           <a:r>
-            <a:rPr lang="en-US" sz="2000" kern="1200" dirty="0">
+            <a:rPr lang="en-US" sz="1400" kern="1200" dirty="0">
               <a:solidFill>
                 <a:srgbClr val="FF0000"/>
               </a:solidFill>
@@ -5248,7 +5303,7 @@
             <a:t> </a:t>
           </a:r>
           <a:r>
-            <a:rPr lang="en-US" sz="2000" kern="1200" dirty="0">
+            <a:rPr lang="en-US" sz="1400" kern="1200" dirty="0">
               <a:solidFill>
                 <a:schemeClr val="bg1"/>
               </a:solidFill>
@@ -5256,7 +5311,7 @@
             <a:t>conversion expectation. </a:t>
           </a:r>
           <a:r>
-            <a:rPr lang="en-US" sz="2000" kern="1200" dirty="0">
+            <a:rPr lang="en-US" sz="1400" kern="1200" dirty="0">
               <a:solidFill>
                 <a:srgbClr val="FF0000"/>
               </a:solidFill>
@@ -5264,7 +5319,7 @@
             <a:t>(</a:t>
           </a:r>
           <a:r>
-            <a:rPr lang="en-US" sz="2000" b="1" kern="1200" dirty="0">
+            <a:rPr lang="en-US" sz="1400" b="1" kern="1200" dirty="0">
               <a:solidFill>
                 <a:srgbClr val="FF0000"/>
               </a:solidFill>
@@ -5272,12 +5327,37 @@
             <a:t>Translate to 18 customers</a:t>
           </a:r>
           <a:r>
-            <a:rPr lang="en-US" sz="2000" kern="1200" dirty="0">
+            <a:rPr lang="en-US" sz="1400" kern="1200" dirty="0">
               <a:solidFill>
                 <a:srgbClr val="FF0000"/>
               </a:solidFill>
             </a:rPr>
             <a:t>)</a:t>
+          </a:r>
+        </a:p>
+        <a:p>
+          <a:pPr marL="0" lvl="0" indent="0" algn="l" defTabSz="1066800">
+            <a:lnSpc>
+              <a:spcPct val="90000"/>
+            </a:lnSpc>
+            <a:spcBef>
+              <a:spcPct val="0"/>
+            </a:spcBef>
+            <a:spcAft>
+              <a:spcPct val="35000"/>
+            </a:spcAft>
+            <a:buNone/>
+          </a:pPr>
+          <a:r>
+            <a:rPr lang="en-US" sz="1400" kern="1200" dirty="0">
+              <a:solidFill>
+                <a:prstClr val="black"/>
+              </a:solidFill>
+              <a:latin typeface="Calibri" panose="020F0502020204030204"/>
+              <a:ea typeface="+mn-ea"/>
+              <a:cs typeface="+mn-cs"/>
+            </a:rPr>
+            <a:t>Data Package is more popular out of 3 services</a:t>
           </a:r>
         </a:p>
       </dsp:txBody>
@@ -6886,7 +6966,29 @@
               <a:ea typeface="+mn-ea"/>
               <a:cs typeface="+mn-cs"/>
             </a:rPr>
-            <a:t>Shape (53906,16)</a:t>
+            <a:t>Shape </a:t>
+          </a:r>
+          <a:r>
+            <a:rPr lang="en-US" sz="1100" kern="1200">
+              <a:solidFill>
+                <a:prstClr val="black"/>
+              </a:solidFill>
+              <a:latin typeface="Calibri" panose="020F0502020204030204"/>
+              <a:ea typeface="+mn-ea"/>
+              <a:cs typeface="+mn-cs"/>
+            </a:rPr>
+            <a:t>(71286,16</a:t>
+          </a:r>
+          <a:r>
+            <a:rPr lang="en-US" sz="1100" kern="1200" dirty="0">
+              <a:solidFill>
+                <a:prstClr val="black"/>
+              </a:solidFill>
+              <a:latin typeface="Calibri" panose="020F0502020204030204"/>
+              <a:ea typeface="+mn-ea"/>
+              <a:cs typeface="+mn-cs"/>
+            </a:rPr>
+            <a:t>)</a:t>
           </a:r>
         </a:p>
         <a:p>
@@ -7647,7 +7749,26 @@
                 <a:schemeClr val="bg1"/>
               </a:solidFill>
             </a:rPr>
-            <a:t>Page Views: 53906 </a:t>
+            <a:t>Page Views: </a:t>
+          </a:r>
+          <a:r>
+            <a:rPr lang="en-US" sz="1400" kern="1200" dirty="0">
+              <a:solidFill>
+                <a:prstClr val="black"/>
+              </a:solidFill>
+              <a:latin typeface="Calibri" panose="020F0502020204030204"/>
+              <a:ea typeface="+mn-ea"/>
+              <a:cs typeface="+mn-cs"/>
+            </a:rPr>
+            <a:t>71286</a:t>
+          </a:r>
+          <a:r>
+            <a:rPr lang="en-US" sz="1400" kern="1200" dirty="0">
+              <a:solidFill>
+                <a:schemeClr val="bg1"/>
+              </a:solidFill>
+            </a:rPr>
+            <a:t> </a:t>
           </a:r>
         </a:p>
       </dsp:txBody>
@@ -13347,7 +13468,7 @@
           <a:p>
             <a:fld id="{AEBC8BF4-0848-294F-8741-C1F739311D2C}" type="datetimeFigureOut">
               <a:rPr lang="en-US" smtClean="0"/>
-              <a:t>10/9/18</a:t>
+              <a:t>10/10/18</a:t>
             </a:fld>
             <a:endParaRPr lang="en-US"/>
           </a:p>
@@ -13742,6 +13863,49 @@
           <a:bodyPr/>
           <a:lstStyle/>
           <a:p>
+            <a:pPr marL="0" marR="0" lvl="0" indent="0" algn="l" defTabSz="914400" rtl="0" eaLnBrk="1" fontAlgn="auto" latinLnBrk="0" hangingPunct="1">
+              <a:lnSpc>
+                <a:spcPct val="100000"/>
+              </a:lnSpc>
+              <a:spcBef>
+                <a:spcPts val="0"/>
+              </a:spcBef>
+              <a:spcAft>
+                <a:spcPts val="0"/>
+              </a:spcAft>
+              <a:buClrTx/>
+              <a:buSzTx/>
+              <a:buFontTx/>
+              <a:buNone/>
+              <a:tabLst/>
+              <a:defRPr/>
+            </a:pPr>
+            <a:r>
+              <a:rPr lang="en-US" sz="1200" kern="1200" dirty="0">
+                <a:solidFill>
+                  <a:schemeClr val="tx1"/>
+                </a:solidFill>
+                <a:effectLst/>
+                <a:latin typeface="+mn-lt"/>
+                <a:ea typeface="+mn-ea"/>
+                <a:cs typeface="+mn-cs"/>
+              </a:rPr>
+              <a:t>MQL: Most Qualified Lead’s</a:t>
+            </a:r>
+            <a:endParaRPr lang="en-US" dirty="0"/>
+          </a:p>
+          <a:p>
+            <a:endParaRPr lang="en-US" sz="1200" kern="1200" dirty="0">
+              <a:solidFill>
+                <a:schemeClr val="tx1"/>
+              </a:solidFill>
+              <a:effectLst/>
+              <a:latin typeface="+mn-lt"/>
+              <a:ea typeface="+mn-ea"/>
+              <a:cs typeface="+mn-cs"/>
+            </a:endParaRPr>
+          </a:p>
+          <a:p>
             <a:r>
               <a:rPr lang="en-US" sz="1200" kern="1200" dirty="0">
                 <a:solidFill>
@@ -13805,55 +13969,7 @@
                 <a:ea typeface="+mn-ea"/>
                 <a:cs typeface="+mn-cs"/>
               </a:rPr>
-              <a:t>While the trial is going on the engineering team has instrumented the click stream telemetry in the services. They have tried Google analytics /</a:t>
-            </a:r>
-            <a:r>
-              <a:rPr lang="en-US" sz="1200" kern="1200" dirty="0" err="1">
-                <a:solidFill>
-                  <a:schemeClr val="tx1"/>
-                </a:solidFill>
-                <a:effectLst/>
-                <a:latin typeface="+mn-lt"/>
-                <a:ea typeface="+mn-ea"/>
-                <a:cs typeface="+mn-cs"/>
-              </a:rPr>
-              <a:t>Mixpanel</a:t>
-            </a:r>
-            <a:r>
-              <a:rPr lang="en-US" sz="1200" kern="1200" dirty="0">
-                <a:solidFill>
-                  <a:schemeClr val="tx1"/>
-                </a:solidFill>
-                <a:effectLst/>
-                <a:latin typeface="+mn-lt"/>
-                <a:ea typeface="+mn-ea"/>
-                <a:cs typeface="+mn-cs"/>
-              </a:rPr>
-              <a:t> in previous launches. But for these new services they have chosen </a:t>
-            </a:r>
-            <a:r>
-              <a:rPr lang="en-US" sz="1200" kern="1200" dirty="0" err="1">
-                <a:solidFill>
-                  <a:schemeClr val="tx1"/>
-                </a:solidFill>
-                <a:effectLst/>
-                <a:latin typeface="+mn-lt"/>
-                <a:ea typeface="+mn-ea"/>
-                <a:cs typeface="+mn-cs"/>
-              </a:rPr>
-              <a:t>Fullstory</a:t>
-            </a:r>
-            <a:r>
-              <a:rPr lang="en-US" sz="1200" kern="1200" dirty="0">
-                <a:solidFill>
-                  <a:schemeClr val="tx1"/>
-                </a:solidFill>
-                <a:effectLst/>
-                <a:latin typeface="+mn-lt"/>
-                <a:ea typeface="+mn-ea"/>
-                <a:cs typeface="+mn-cs"/>
-              </a:rPr>
-              <a:t>  </a:t>
+              <a:t>While the trial is going on the engineering team has instrumented the click stream telemetry in the services. They have tried Google analytics /Mixpanel in previous launches. But for these new services they have chosen Fullstory  </a:t>
             </a:r>
             <a:r>
               <a:rPr lang="en-US" sz="1200" u="sng" kern="1200" dirty="0">
@@ -13983,563 +14099,6 @@
         <p:txBody>
           <a:bodyPr/>
           <a:lstStyle/>
-          <a:p>
-            <a:pPr marL="228600" indent="-228600">
-              <a:buAutoNum type="arabicPeriod"/>
-            </a:pPr>
-            <a:r>
-              <a:rPr lang="en-US" dirty="0"/>
-              <a:t>Read CSV Combined_data.cvs is the combined data of two bundles.</a:t>
-            </a:r>
-          </a:p>
-          <a:p>
-            <a:pPr marL="228600" indent="-228600">
-              <a:buAutoNum type="arabicPeriod"/>
-            </a:pPr>
-            <a:r>
-              <a:rPr lang="en-US" dirty="0"/>
-              <a:t>We apply below masking:</a:t>
-            </a:r>
-          </a:p>
-          <a:p>
-            <a:pPr lvl="2"/>
-            <a:r>
-              <a:rPr lang="en-US" dirty="0"/>
-              <a:t>What we are masking: </a:t>
-            </a:r>
-          </a:p>
-          <a:p>
-            <a:pPr marL="1143000" lvl="2" indent="-228600">
-              <a:buAutoNum type="arabicPeriod"/>
-            </a:pPr>
-            <a:r>
-              <a:rPr lang="en-US" dirty="0"/>
-              <a:t>Dropping rows with extra services we don’t care they were part of some POC</a:t>
-            </a:r>
-          </a:p>
-          <a:p>
-            <a:pPr marL="1600200" lvl="3" indent="-228600">
-              <a:buAutoNum type="arabicPeriod"/>
-            </a:pPr>
-            <a:r>
-              <a:rPr lang="en-US" dirty="0"/>
-              <a:t>Size of data before dropping </a:t>
-            </a:r>
-            <a:r>
-              <a:rPr lang="en-US" dirty="0" err="1"/>
-              <a:t>servcies</a:t>
-            </a:r>
-            <a:r>
-              <a:rPr lang="en-US" dirty="0"/>
-              <a:t> (753495, 35) </a:t>
-            </a:r>
-          </a:p>
-          <a:p>
-            <a:pPr marL="1600200" lvl="3" indent="-228600">
-              <a:buAutoNum type="arabicPeriod"/>
-            </a:pPr>
-            <a:r>
-              <a:rPr lang="en-US" dirty="0"/>
-              <a:t>Size of data after dropping </a:t>
-            </a:r>
-            <a:r>
-              <a:rPr lang="en-US" dirty="0" err="1"/>
-              <a:t>servcies</a:t>
-            </a:r>
-            <a:r>
-              <a:rPr lang="en-US" dirty="0"/>
-              <a:t> (711158, 35) </a:t>
-            </a:r>
-          </a:p>
-          <a:p>
-            <a:pPr marL="1143000" lvl="2" indent="-228600">
-              <a:buAutoNum type="arabicPeriod"/>
-            </a:pPr>
-            <a:r>
-              <a:rPr lang="en-US" dirty="0"/>
-              <a:t>Masking Services  </a:t>
-            </a:r>
-          </a:p>
-          <a:p>
-            <a:pPr marL="1600200" lvl="3" indent="-228600">
-              <a:buAutoNum type="arabicPeriod"/>
-            </a:pPr>
-            <a:r>
-              <a:rPr lang="en-US" dirty="0"/>
-              <a:t>Size of data (711158, 35)</a:t>
-            </a:r>
-          </a:p>
-          <a:p>
-            <a:pPr marL="1143000" lvl="2" indent="-228600">
-              <a:buAutoNum type="arabicPeriod"/>
-            </a:pPr>
-            <a:r>
-              <a:rPr lang="en-US" dirty="0"/>
-              <a:t>Masking sensitive URLs</a:t>
-            </a:r>
-          </a:p>
-          <a:p>
-            <a:pPr marL="1600200" lvl="3" indent="-228600">
-              <a:buAutoNum type="arabicPeriod"/>
-            </a:pPr>
-            <a:r>
-              <a:rPr lang="en-US" dirty="0"/>
-              <a:t>Size of data (711158, 35)</a:t>
-            </a:r>
-          </a:p>
-          <a:p>
-            <a:pPr marL="1143000" lvl="2" indent="-228600">
-              <a:buAutoNum type="arabicPeriod"/>
-            </a:pPr>
-            <a:r>
-              <a:rPr lang="en-US" dirty="0"/>
-              <a:t>Dropping columns that are not required</a:t>
-            </a:r>
-          </a:p>
-          <a:p>
-            <a:pPr marL="1600200" lvl="3" indent="-228600">
-              <a:buAutoNum type="arabicPeriod"/>
-            </a:pPr>
-            <a:r>
-              <a:rPr lang="en-US" dirty="0"/>
-              <a:t>number of columns before :35</a:t>
-            </a:r>
-          </a:p>
-          <a:p>
-            <a:pPr marL="1600200" lvl="3" indent="-228600">
-              <a:buAutoNum type="arabicPeriod"/>
-            </a:pPr>
-            <a:r>
-              <a:rPr lang="en-US" dirty="0"/>
-              <a:t>number of columns After :34</a:t>
-            </a:r>
-          </a:p>
-          <a:p>
-            <a:endParaRPr lang="en-US" dirty="0"/>
-          </a:p>
-          <a:p>
-            <a:r>
-              <a:rPr lang="en-US" dirty="0"/>
-              <a:t>3. We apply below cleaning and filters to data post masking:</a:t>
-            </a:r>
-          </a:p>
-          <a:p>
-            <a:pPr lvl="2"/>
-            <a:r>
-              <a:rPr lang="en-US" dirty="0"/>
-              <a:t>What we are cleaning:</a:t>
-            </a:r>
-          </a:p>
-          <a:p>
-            <a:pPr marL="1143000" lvl="2" indent="-228600">
-              <a:buAutoNum type="arabicPeriod"/>
-            </a:pPr>
-            <a:r>
-              <a:rPr lang="en-US" dirty="0"/>
-              <a:t>Dropped column </a:t>
-            </a:r>
-            <a:r>
-              <a:rPr lang="en-US" dirty="0" err="1"/>
-              <a:t>Unname</a:t>
-            </a:r>
-            <a:r>
-              <a:rPr lang="en-US" dirty="0"/>
-              <a:t> 0 :</a:t>
-            </a:r>
-          </a:p>
-          <a:p>
-            <a:pPr marL="1600200" lvl="3" indent="-228600">
-              <a:buAutoNum type="arabicPeriod"/>
-            </a:pPr>
-            <a:r>
-              <a:rPr lang="en-US" dirty="0"/>
-              <a:t>number of columns before :36 </a:t>
-            </a:r>
-          </a:p>
-          <a:p>
-            <a:pPr marL="1600200" lvl="3" indent="-228600">
-              <a:buAutoNum type="arabicPeriod"/>
-            </a:pPr>
-            <a:r>
-              <a:rPr lang="en-US" dirty="0"/>
-              <a:t>number of columns After :35</a:t>
-            </a:r>
-          </a:p>
-          <a:p>
-            <a:pPr marL="1143000" lvl="2" indent="-228600">
-              <a:buAutoNum type="arabicPeriod"/>
-            </a:pPr>
-            <a:r>
-              <a:rPr lang="en-US" dirty="0"/>
-              <a:t>Adding Domain Column</a:t>
-            </a:r>
-          </a:p>
-          <a:p>
-            <a:pPr marL="1600200" marR="0" lvl="3" indent="-228600" algn="l" defTabSz="914400" rtl="0" eaLnBrk="1" fontAlgn="auto" latinLnBrk="0" hangingPunct="1">
-              <a:lnSpc>
-                <a:spcPct val="100000"/>
-              </a:lnSpc>
-              <a:spcBef>
-                <a:spcPts val="0"/>
-              </a:spcBef>
-              <a:spcAft>
-                <a:spcPts val="0"/>
-              </a:spcAft>
-              <a:buClrTx/>
-              <a:buSzTx/>
-              <a:buFontTx/>
-              <a:buAutoNum type="arabicPeriod"/>
-              <a:tabLst/>
-              <a:defRPr/>
-            </a:pPr>
-            <a:r>
-              <a:rPr lang="en-US" dirty="0"/>
-              <a:t>Shape of exports read from CSV : (711158, 36)</a:t>
-            </a:r>
-          </a:p>
-          <a:p>
-            <a:pPr lvl="2"/>
-            <a:r>
-              <a:rPr lang="en-US" dirty="0"/>
-              <a:t>3. Drop rows that do not have email and remove all email rows of internal folks</a:t>
-            </a:r>
-          </a:p>
-          <a:p>
-            <a:pPr lvl="3"/>
-            <a:r>
-              <a:rPr lang="en-US" dirty="0"/>
-              <a:t>1. Shape of </a:t>
-            </a:r>
-            <a:r>
-              <a:rPr lang="en-US" dirty="0" err="1"/>
-              <a:t>dataframe</a:t>
-            </a:r>
-            <a:r>
-              <a:rPr lang="en-US" dirty="0"/>
-              <a:t> after dropping internal users : (78291, 36)</a:t>
-            </a:r>
-          </a:p>
-          <a:p>
-            <a:pPr lvl="2"/>
-            <a:r>
-              <a:rPr lang="en-US" dirty="0"/>
-              <a:t>4. Set uppercase and lower case email and remove duplicates to avoid double counting</a:t>
-            </a:r>
-          </a:p>
-          <a:p>
-            <a:pPr lvl="2"/>
-            <a:r>
-              <a:rPr lang="en-US" dirty="0"/>
-              <a:t>5. Dropping unwanted columns.</a:t>
-            </a:r>
-          </a:p>
-          <a:p>
-            <a:pPr lvl="3"/>
-            <a:r>
-              <a:rPr lang="en-US" dirty="0"/>
-              <a:t>1.Shape of </a:t>
-            </a:r>
-            <a:r>
-              <a:rPr lang="en-US" dirty="0" err="1"/>
-              <a:t>dataframe</a:t>
-            </a:r>
-            <a:r>
-              <a:rPr lang="en-US" dirty="0"/>
-              <a:t> after dropping extra columns: (78291, 15)</a:t>
-            </a:r>
-          </a:p>
-          <a:p>
-            <a:pPr lvl="2"/>
-            <a:r>
-              <a:rPr lang="en-US" dirty="0"/>
-              <a:t>6. Renaming columns to have better understanding</a:t>
-            </a:r>
-          </a:p>
-          <a:p>
-            <a:pPr lvl="2"/>
-            <a:r>
-              <a:rPr lang="en-US" dirty="0"/>
-              <a:t>7. Three Services in all we have  ['Data Logging', 'SDK', 'Data Package’]</a:t>
-            </a:r>
-          </a:p>
-          <a:p>
-            <a:pPr lvl="2"/>
-            <a:r>
-              <a:rPr lang="en-US" dirty="0"/>
-              <a:t>8. Masking company names</a:t>
-            </a:r>
-          </a:p>
-          <a:p>
-            <a:pPr lvl="0"/>
-            <a:r>
-              <a:rPr lang="en-US" dirty="0"/>
-              <a:t>4. </a:t>
-            </a:r>
-            <a:r>
-              <a:rPr lang="en-US" dirty="0" err="1"/>
-              <a:t>LoadExternalDataAndWork</a:t>
-            </a:r>
-            <a:r>
-              <a:rPr lang="en-US" dirty="0"/>
-              <a:t>:</a:t>
-            </a:r>
-          </a:p>
-          <a:p>
-            <a:pPr lvl="0"/>
-            <a:r>
-              <a:rPr lang="en-US" dirty="0"/>
-              <a:t>	1. Adding new normalized column </a:t>
-            </a:r>
-            <a:r>
-              <a:rPr lang="en-US" dirty="0" err="1"/>
-              <a:t>PageUrl_Norm</a:t>
-            </a:r>
-            <a:endParaRPr lang="en-US" dirty="0"/>
-          </a:p>
-          <a:p>
-            <a:pPr lvl="0"/>
-            <a:r>
-              <a:rPr lang="en-US" dirty="0"/>
-              <a:t>	2. Answer active users or company by unique  session ID count</a:t>
-            </a:r>
-          </a:p>
-          <a:p>
-            <a:pPr lvl="0"/>
-            <a:r>
-              <a:rPr lang="en-US" dirty="0"/>
-              <a:t>	3. Total Active Customers 39 and Top 15 customer by session count. (</a:t>
-            </a:r>
-            <a:r>
-              <a:rPr lang="en-US" dirty="0" err="1"/>
-              <a:t>groupby</a:t>
-            </a:r>
-            <a:r>
-              <a:rPr lang="en-US" dirty="0"/>
-              <a:t>(["Domain"])['</a:t>
-            </a:r>
-            <a:r>
-              <a:rPr lang="en-US" dirty="0" err="1"/>
-              <a:t>UserId</a:t>
-            </a:r>
-            <a:r>
-              <a:rPr lang="en-US" dirty="0"/>
-              <a:t>'].</a:t>
-            </a:r>
-            <a:r>
-              <a:rPr lang="en-US" dirty="0" err="1"/>
-              <a:t>nunique</a:t>
-            </a:r>
-            <a:r>
-              <a:rPr lang="en-US" dirty="0"/>
-              <a:t>())</a:t>
-            </a:r>
-          </a:p>
-          <a:p>
-            <a:pPr lvl="0"/>
-            <a:r>
-              <a:rPr lang="en-US" dirty="0"/>
-              <a:t>	4. Graph plotted for Top 15 Customer by Session Count</a:t>
-            </a:r>
-          </a:p>
-          <a:p>
-            <a:pPr lvl="0"/>
-            <a:r>
-              <a:rPr lang="en-US" dirty="0"/>
-              <a:t>	5. Average Session Time Per Company: </a:t>
-            </a:r>
-            <a:r>
-              <a:rPr lang="en-US" dirty="0" err="1"/>
-              <a:t>PageInactiveTime</a:t>
-            </a:r>
-            <a:r>
-              <a:rPr lang="en-US" dirty="0"/>
-              <a:t> = </a:t>
-            </a:r>
-            <a:r>
-              <a:rPr lang="en-US" dirty="0" err="1"/>
-              <a:t>PageDuration</a:t>
-            </a:r>
-            <a:r>
-              <a:rPr lang="en-US" dirty="0"/>
-              <a:t> – </a:t>
-            </a:r>
-            <a:r>
-              <a:rPr lang="en-US" dirty="0" err="1"/>
-              <a:t>PageActiveDuration</a:t>
-            </a:r>
-            <a:r>
-              <a:rPr lang="en-US" dirty="0"/>
-              <a:t> and then : </a:t>
-            </a:r>
-          </a:p>
-          <a:p>
-            <a:pPr lvl="0"/>
-            <a:r>
-              <a:rPr lang="en-US" dirty="0"/>
-              <a:t>                                                                                     </a:t>
-            </a:r>
-            <a:r>
-              <a:rPr lang="en-US" dirty="0" err="1"/>
-              <a:t>groupby</a:t>
-            </a:r>
-            <a:r>
-              <a:rPr lang="en-US" dirty="0"/>
-              <a:t>(["Domain","</a:t>
-            </a:r>
-            <a:r>
-              <a:rPr lang="en-US" dirty="0" err="1"/>
-              <a:t>UserEmail</a:t>
-            </a:r>
-            <a:r>
-              <a:rPr lang="en-US" dirty="0"/>
-              <a:t>", "</a:t>
-            </a:r>
-            <a:r>
-              <a:rPr lang="en-US" dirty="0" err="1"/>
-              <a:t>UserId</a:t>
-            </a:r>
-            <a:r>
-              <a:rPr lang="en-US" dirty="0"/>
-              <a:t>"]).head(1).</a:t>
-            </a:r>
-            <a:r>
-              <a:rPr lang="en-US" dirty="0" err="1"/>
-              <a:t>reset_index</a:t>
-            </a:r>
-            <a:r>
-              <a:rPr lang="en-US" dirty="0"/>
-              <a:t>(drop=True)</a:t>
-            </a:r>
-          </a:p>
-          <a:p>
-            <a:pPr lvl="0"/>
-            <a:r>
-              <a:rPr lang="en-US" dirty="0"/>
-              <a:t>	6. Merging above two data set and then </a:t>
-            </a:r>
-            <a:r>
-              <a:rPr lang="en-US" dirty="0" err="1"/>
-              <a:t>Activecustomer</a:t>
-            </a:r>
-            <a:r>
-              <a:rPr lang="en-US" dirty="0"/>
-              <a:t> Score: by using Dense Rank and allocating weights to find weightage rank</a:t>
-            </a:r>
-          </a:p>
-          <a:p>
-            <a:pPr lvl="0"/>
-            <a:r>
-              <a:rPr lang="en-US" dirty="0"/>
-              <a:t>	7. </a:t>
-            </a:r>
-            <a:r>
-              <a:rPr lang="en-US" dirty="0" err="1"/>
-              <a:t>df</a:t>
-            </a:r>
-            <a:r>
-              <a:rPr lang="en-US" dirty="0"/>
-              <a:t> = 'Domain', '</a:t>
-            </a:r>
-            <a:r>
-              <a:rPr lang="en-US" dirty="0" err="1"/>
-              <a:t>SessionCount</a:t>
-            </a:r>
-            <a:r>
-              <a:rPr lang="en-US" dirty="0"/>
-              <a:t>', '</a:t>
-            </a:r>
-            <a:r>
-              <a:rPr lang="en-US" dirty="0" err="1"/>
-              <a:t>AverageSessionTime</a:t>
-            </a:r>
-            <a:r>
-              <a:rPr lang="en-US" dirty="0"/>
-              <a:t> (Mins)', '</a:t>
-            </a:r>
-            <a:r>
-              <a:rPr lang="en-US" dirty="0" err="1"/>
-              <a:t>AverageActiveSessionTime</a:t>
-            </a:r>
-            <a:r>
-              <a:rPr lang="en-US" dirty="0"/>
-              <a:t> (Mins)', '</a:t>
-            </a:r>
-            <a:r>
-              <a:rPr lang="en-US" dirty="0" err="1"/>
-              <a:t>AverageInActiveSessionTime</a:t>
-            </a:r>
-            <a:r>
-              <a:rPr lang="en-US" dirty="0"/>
-              <a:t> (Mins)','</a:t>
-            </a:r>
-            <a:r>
-              <a:rPr lang="en-US" dirty="0" err="1"/>
-              <a:t>ActiveCustomer_score</a:t>
-            </a:r>
-            <a:r>
-              <a:rPr lang="en-US" dirty="0"/>
-              <a:t>’</a:t>
-            </a:r>
-          </a:p>
-          <a:p>
-            <a:pPr lvl="0"/>
-            <a:r>
-              <a:rPr lang="en-US" dirty="0"/>
-              <a:t>	8. '</a:t>
-            </a:r>
-            <a:r>
-              <a:rPr lang="en-US" dirty="0" err="1"/>
-              <a:t>AverageSessionTime</a:t>
-            </a:r>
-            <a:r>
-              <a:rPr lang="en-US" dirty="0"/>
-              <a:t> (Mins)',  '</a:t>
-            </a:r>
-            <a:r>
-              <a:rPr lang="en-US" dirty="0" err="1"/>
-              <a:t>AverageActiveSessionTime</a:t>
-            </a:r>
-            <a:r>
-              <a:rPr lang="en-US" dirty="0"/>
-              <a:t> (Mins)', '</a:t>
-            </a:r>
-            <a:r>
-              <a:rPr lang="en-US" dirty="0" err="1"/>
-              <a:t>AverageInActiveSessionTime</a:t>
-            </a:r>
-            <a:r>
-              <a:rPr lang="en-US" dirty="0"/>
-              <a:t> (Mins)’ cols are /1000/60 to find average session time per</a:t>
-            </a:r>
-          </a:p>
-          <a:p>
-            <a:pPr lvl="0"/>
-            <a:r>
-              <a:rPr lang="en-US" dirty="0"/>
-              <a:t>                         Company in seconds</a:t>
-            </a:r>
-          </a:p>
-          <a:p>
-            <a:pPr lvl="0"/>
-            <a:r>
-              <a:rPr lang="en-US" dirty="0"/>
-              <a:t>	9. KPI’s stacked bar plotted: Most Active Customers based on Session count, active time and inactive time</a:t>
-            </a:r>
-          </a:p>
-          <a:p>
-            <a:pPr lvl="0"/>
-            <a:r>
-              <a:rPr lang="en-US" dirty="0"/>
-              <a:t>5. Now we want to see top used Services overall:</a:t>
-            </a:r>
-          </a:p>
-          <a:p>
-            <a:pPr lvl="0"/>
-            <a:r>
-              <a:rPr lang="en-US" dirty="0"/>
-              <a:t>6. Pie Chart plotted for seeing which is the top service used overall</a:t>
-            </a:r>
-          </a:p>
           <a:p>
             <a:pPr lvl="0"/>
             <a:endParaRPr lang="en-US" dirty="0"/>
@@ -14720,6 +14279,90 @@
           <a:bodyPr/>
           <a:lstStyle/>
           <a:p>
+            <a:endParaRPr lang="en-US"/>
+          </a:p>
+        </p:txBody>
+      </p:sp>
+      <p:sp>
+        <p:nvSpPr>
+          <p:cNvPr id="4" name="Slide Number Placeholder 3"/>
+          <p:cNvSpPr>
+            <a:spLocks noGrp="1"/>
+          </p:cNvSpPr>
+          <p:nvPr>
+            <p:ph type="sldNum" sz="quarter" idx="5"/>
+          </p:nvPr>
+        </p:nvSpPr>
+        <p:spPr/>
+        <p:txBody>
+          <a:bodyPr/>
+          <a:lstStyle/>
+          <a:p>
+            <a:fld id="{B00ADEC6-3069-7D44-8E85-757029A2F8EF}" type="slidenum">
+              <a:rPr lang="en-US" smtClean="0"/>
+              <a:t>10</a:t>
+            </a:fld>
+            <a:endParaRPr lang="en-US"/>
+          </a:p>
+        </p:txBody>
+      </p:sp>
+    </p:spTree>
+    <p:extLst>
+      <p:ext uri="{BB962C8B-B14F-4D97-AF65-F5344CB8AC3E}">
+        <p14:creationId xmlns:p14="http://schemas.microsoft.com/office/powerpoint/2010/main" val="3788641554"/>
+      </p:ext>
+    </p:extLst>
+  </p:cSld>
+  <p:clrMapOvr>
+    <a:masterClrMapping/>
+  </p:clrMapOvr>
+</p:notes>
+</file>
+
+<file path=ppt/notesSlides/notesSlide6.xml><?xml version="1.0" encoding="utf-8"?>
+<p:notes xmlns:a="http://schemas.openxmlformats.org/drawingml/2006/main" xmlns:r="http://schemas.openxmlformats.org/officeDocument/2006/relationships" xmlns:p="http://schemas.openxmlformats.org/presentationml/2006/main">
+  <p:cSld>
+    <p:spTree>
+      <p:nvGrpSpPr>
+        <p:cNvPr id="1" name=""/>
+        <p:cNvGrpSpPr/>
+        <p:nvPr/>
+      </p:nvGrpSpPr>
+      <p:grpSpPr>
+        <a:xfrm>
+          <a:off x="0" y="0"/>
+          <a:ext cx="0" cy="0"/>
+          <a:chOff x="0" y="0"/>
+          <a:chExt cx="0" cy="0"/>
+        </a:xfrm>
+      </p:grpSpPr>
+      <p:sp>
+        <p:nvSpPr>
+          <p:cNvPr id="2" name="Slide Image Placeholder 1"/>
+          <p:cNvSpPr>
+            <a:spLocks noGrp="1" noRot="1" noChangeAspect="1"/>
+          </p:cNvSpPr>
+          <p:nvPr>
+            <p:ph type="sldImg"/>
+          </p:nvPr>
+        </p:nvSpPr>
+        <p:spPr/>
+      </p:sp>
+      <p:sp>
+        <p:nvSpPr>
+          <p:cNvPr id="3" name="Notes Placeholder 2"/>
+          <p:cNvSpPr>
+            <a:spLocks noGrp="1"/>
+          </p:cNvSpPr>
+          <p:nvPr>
+            <p:ph type="body" idx="1"/>
+          </p:nvPr>
+        </p:nvSpPr>
+        <p:spPr/>
+        <p:txBody>
+          <a:bodyPr/>
+          <a:lstStyle/>
+          <a:p>
             <a:endParaRPr lang="en-US" dirty="0"/>
           </a:p>
         </p:txBody>
@@ -14741,7 +14384,7 @@
           <a:p>
             <a:fld id="{B00ADEC6-3069-7D44-8E85-757029A2F8EF}" type="slidenum">
               <a:rPr lang="en-US" smtClean="0"/>
-              <a:t>14</a:t>
+              <a:t>15</a:t>
             </a:fld>
             <a:endParaRPr lang="en-US"/>
           </a:p>
@@ -14891,7 +14534,7 @@
           <a:p>
             <a:fld id="{0A7504A3-D017-D746-8812-9F55F910143D}" type="datetimeFigureOut">
               <a:rPr lang="en-US" smtClean="0"/>
-              <a:t>10/9/18</a:t>
+              <a:t>10/10/18</a:t>
             </a:fld>
             <a:endParaRPr lang="en-US"/>
           </a:p>
@@ -15061,7 +14704,7 @@
           <a:p>
             <a:fld id="{0A7504A3-D017-D746-8812-9F55F910143D}" type="datetimeFigureOut">
               <a:rPr lang="en-US" smtClean="0"/>
-              <a:t>10/9/18</a:t>
+              <a:t>10/10/18</a:t>
             </a:fld>
             <a:endParaRPr lang="en-US"/>
           </a:p>
@@ -15241,7 +14884,7 @@
           <a:p>
             <a:fld id="{0A7504A3-D017-D746-8812-9F55F910143D}" type="datetimeFigureOut">
               <a:rPr lang="en-US" smtClean="0"/>
-              <a:t>10/9/18</a:t>
+              <a:t>10/10/18</a:t>
             </a:fld>
             <a:endParaRPr lang="en-US"/>
           </a:p>
@@ -15411,7 +15054,7 @@
           <a:p>
             <a:fld id="{0A7504A3-D017-D746-8812-9F55F910143D}" type="datetimeFigureOut">
               <a:rPr lang="en-US" smtClean="0"/>
-              <a:t>10/9/18</a:t>
+              <a:t>10/10/18</a:t>
             </a:fld>
             <a:endParaRPr lang="en-US"/>
           </a:p>
@@ -15657,7 +15300,7 @@
           <a:p>
             <a:fld id="{0A7504A3-D017-D746-8812-9F55F910143D}" type="datetimeFigureOut">
               <a:rPr lang="en-US" smtClean="0"/>
-              <a:t>10/9/18</a:t>
+              <a:t>10/10/18</a:t>
             </a:fld>
             <a:endParaRPr lang="en-US"/>
           </a:p>
@@ -15889,7 +15532,7 @@
           <a:p>
             <a:fld id="{0A7504A3-D017-D746-8812-9F55F910143D}" type="datetimeFigureOut">
               <a:rPr lang="en-US" smtClean="0"/>
-              <a:t>10/9/18</a:t>
+              <a:t>10/10/18</a:t>
             </a:fld>
             <a:endParaRPr lang="en-US"/>
           </a:p>
@@ -16256,7 +15899,7 @@
           <a:p>
             <a:fld id="{0A7504A3-D017-D746-8812-9F55F910143D}" type="datetimeFigureOut">
               <a:rPr lang="en-US" smtClean="0"/>
-              <a:t>10/9/18</a:t>
+              <a:t>10/10/18</a:t>
             </a:fld>
             <a:endParaRPr lang="en-US"/>
           </a:p>
@@ -16374,7 +16017,7 @@
           <a:p>
             <a:fld id="{0A7504A3-D017-D746-8812-9F55F910143D}" type="datetimeFigureOut">
               <a:rPr lang="en-US" smtClean="0"/>
-              <a:t>10/9/18</a:t>
+              <a:t>10/10/18</a:t>
             </a:fld>
             <a:endParaRPr lang="en-US"/>
           </a:p>
@@ -16469,7 +16112,7 @@
           <a:p>
             <a:fld id="{0A7504A3-D017-D746-8812-9F55F910143D}" type="datetimeFigureOut">
               <a:rPr lang="en-US" smtClean="0"/>
-              <a:t>10/9/18</a:t>
+              <a:t>10/10/18</a:t>
             </a:fld>
             <a:endParaRPr lang="en-US"/>
           </a:p>
@@ -16746,7 +16389,7 @@
           <a:p>
             <a:fld id="{0A7504A3-D017-D746-8812-9F55F910143D}" type="datetimeFigureOut">
               <a:rPr lang="en-US" smtClean="0"/>
-              <a:t>10/9/18</a:t>
+              <a:t>10/10/18</a:t>
             </a:fld>
             <a:endParaRPr lang="en-US"/>
           </a:p>
@@ -17003,7 +16646,7 @@
           <a:p>
             <a:fld id="{0A7504A3-D017-D746-8812-9F55F910143D}" type="datetimeFigureOut">
               <a:rPr lang="en-US" smtClean="0"/>
-              <a:t>10/9/18</a:t>
+              <a:t>10/10/18</a:t>
             </a:fld>
             <a:endParaRPr lang="en-US"/>
           </a:p>
@@ -17216,7 +16859,7 @@
           <a:p>
             <a:fld id="{0A7504A3-D017-D746-8812-9F55F910143D}" type="datetimeFigureOut">
               <a:rPr lang="en-US" smtClean="0"/>
-              <a:t>10/9/18</a:t>
+              <a:t>10/10/18</a:t>
             </a:fld>
             <a:endParaRPr lang="en-US"/>
           </a:p>
@@ -17697,7 +17340,7 @@
             <a:pPr algn="l"/>
             <a:r>
               <a:rPr lang="en-US" sz="2000" dirty="0"/>
-              <a:t>Driving you business decisions</a:t>
+              <a:t>Driving your business decisions</a:t>
             </a:r>
           </a:p>
         </p:txBody>
@@ -18192,123 +17835,12 @@
           </a:p>
         </p:txBody>
       </p:sp>
-      <p:grpSp>
-        <p:nvGrpSpPr>
-          <p:cNvPr id="24" name="Group 23">
+      <p:sp>
+        <p:nvSpPr>
+          <p:cNvPr id="19" name="TextBox 18">
             <a:extLst>
               <a:ext uri="{FF2B5EF4-FFF2-40B4-BE49-F238E27FC236}">
-                <a16:creationId xmlns:a16="http://schemas.microsoft.com/office/drawing/2014/main" id="{8A380773-5474-B340-990D-6343DC8FCEDB}"/>
-              </a:ext>
-            </a:extLst>
-          </p:cNvPr>
-          <p:cNvGrpSpPr/>
-          <p:nvPr/>
-        </p:nvGrpSpPr>
-        <p:grpSpPr>
-          <a:xfrm>
-            <a:off x="-18070" y="5383512"/>
-            <a:ext cx="4011817" cy="1479237"/>
-            <a:chOff x="-18070" y="5383512"/>
-            <a:chExt cx="4011817" cy="1479237"/>
-          </a:xfrm>
-        </p:grpSpPr>
-        <p:pic>
-          <p:nvPicPr>
-            <p:cNvPr id="12" name="Picture 11">
-              <a:extLst>
-                <a:ext uri="{FF2B5EF4-FFF2-40B4-BE49-F238E27FC236}">
-                  <a16:creationId xmlns:a16="http://schemas.microsoft.com/office/drawing/2014/main" id="{110CE889-71FA-014E-8FF8-A12F98DC839D}"/>
-                </a:ext>
-              </a:extLst>
-            </p:cNvPr>
-            <p:cNvPicPr>
-              <a:picLocks noChangeAspect="1"/>
-            </p:cNvPicPr>
-            <p:nvPr/>
-          </p:nvPicPr>
-          <p:blipFill>
-            <a:blip r:embed="rId9"/>
-            <a:stretch>
-              <a:fillRect/>
-            </a:stretch>
-          </p:blipFill>
-          <p:spPr>
-            <a:xfrm>
-              <a:off x="-18070" y="5383512"/>
-              <a:ext cx="1422621" cy="1479237"/>
-            </a:xfrm>
-            <a:prstGeom prst="rect">
-              <a:avLst/>
-            </a:prstGeom>
-          </p:spPr>
-        </p:pic>
-        <p:pic>
-          <p:nvPicPr>
-            <p:cNvPr id="6" name="Picture 5">
-              <a:extLst>
-                <a:ext uri="{FF2B5EF4-FFF2-40B4-BE49-F238E27FC236}">
-                  <a16:creationId xmlns:a16="http://schemas.microsoft.com/office/drawing/2014/main" id="{73102CFE-05DC-B944-96E4-01FCF866448D}"/>
-                </a:ext>
-              </a:extLst>
-            </p:cNvPr>
-            <p:cNvPicPr>
-              <a:picLocks noChangeAspect="1"/>
-            </p:cNvPicPr>
-            <p:nvPr/>
-          </p:nvPicPr>
-          <p:blipFill>
-            <a:blip r:embed="rId10"/>
-            <a:stretch>
-              <a:fillRect/>
-            </a:stretch>
-          </p:blipFill>
-          <p:spPr>
-            <a:xfrm>
-              <a:off x="1390903" y="5383938"/>
-              <a:ext cx="1352297" cy="1468346"/>
-            </a:xfrm>
-            <a:prstGeom prst="rect">
-              <a:avLst/>
-            </a:prstGeom>
-          </p:spPr>
-        </p:pic>
-        <p:pic>
-          <p:nvPicPr>
-            <p:cNvPr id="9" name="Picture 8">
-              <a:extLst>
-                <a:ext uri="{FF2B5EF4-FFF2-40B4-BE49-F238E27FC236}">
-                  <a16:creationId xmlns:a16="http://schemas.microsoft.com/office/drawing/2014/main" id="{1AAD6B70-4A9E-824B-9D43-C1AD7BCF8DBA}"/>
-                </a:ext>
-              </a:extLst>
-            </p:cNvPr>
-            <p:cNvPicPr>
-              <a:picLocks noChangeAspect="1"/>
-            </p:cNvPicPr>
-            <p:nvPr/>
-          </p:nvPicPr>
-          <p:blipFill>
-            <a:blip r:embed="rId11"/>
-            <a:stretch>
-              <a:fillRect/>
-            </a:stretch>
-          </p:blipFill>
-          <p:spPr>
-            <a:xfrm>
-              <a:off x="2746135" y="5383938"/>
-              <a:ext cx="1247612" cy="1472239"/>
-            </a:xfrm>
-            <a:prstGeom prst="rect">
-              <a:avLst/>
-            </a:prstGeom>
-          </p:spPr>
-        </p:pic>
-      </p:grpSp>
-      <p:sp>
-        <p:nvSpPr>
-          <p:cNvPr id="4" name="TextBox 3">
-            <a:extLst>
-              <a:ext uri="{FF2B5EF4-FFF2-40B4-BE49-F238E27FC236}">
-                <a16:creationId xmlns:a16="http://schemas.microsoft.com/office/drawing/2014/main" id="{3D716B05-61B0-A54C-940E-19E6CDF83821}"/>
+                <a16:creationId xmlns:a16="http://schemas.microsoft.com/office/drawing/2014/main" id="{6AA72830-FC1C-8C47-A8E1-79BA80C8109D}"/>
               </a:ext>
             </a:extLst>
           </p:cNvPr>
@@ -18317,8 +17849,48 @@
         </p:nvSpPr>
         <p:spPr>
           <a:xfrm>
-            <a:off x="11302013" y="6573559"/>
-            <a:ext cx="928459" cy="261610"/>
+            <a:off x="11595998" y="6597228"/>
+            <a:ext cx="668887" cy="261610"/>
+          </a:xfrm>
+          <a:prstGeom prst="rect">
+            <a:avLst/>
+          </a:prstGeom>
+          <a:noFill/>
+        </p:spPr>
+        <p:txBody>
+          <a:bodyPr wrap="square" rtlCol="0">
+            <a:spAutoFit/>
+          </a:bodyPr>
+          <a:lstStyle/>
+          <a:p>
+            <a:r>
+              <a:rPr lang="en-US" sz="1100" dirty="0"/>
+              <a:t>Slide: </a:t>
+            </a:r>
+            <a:fld id="{E81B1F43-2893-C542-AE5A-0BE0AF189F44}" type="slidenum">
+              <a:rPr lang="en-US" sz="1100" smtClean="0"/>
+              <a:t>1</a:t>
+            </a:fld>
+            <a:endParaRPr lang="en-US" sz="1100" dirty="0"/>
+          </a:p>
+        </p:txBody>
+      </p:sp>
+      <p:sp>
+        <p:nvSpPr>
+          <p:cNvPr id="21" name="TextBox 20">
+            <a:extLst>
+              <a:ext uri="{FF2B5EF4-FFF2-40B4-BE49-F238E27FC236}">
+                <a16:creationId xmlns:a16="http://schemas.microsoft.com/office/drawing/2014/main" id="{EC795EF6-3751-6E47-A420-8C2190136895}"/>
+              </a:ext>
+            </a:extLst>
+          </p:cNvPr>
+          <p:cNvSpPr txBox="1"/>
+          <p:nvPr/>
+        </p:nvSpPr>
+        <p:spPr>
+          <a:xfrm>
+            <a:off x="2261398" y="5984036"/>
+            <a:ext cx="1263487" cy="338554"/>
           </a:xfrm>
           <a:prstGeom prst="rect">
             <a:avLst/>
@@ -18332,13 +17904,42 @@
           <a:lstStyle/>
           <a:p>
             <a:r>
-              <a:rPr lang="en-US" sz="1050" dirty="0">
+              <a:rPr lang="en-US" sz="1600" b="1" dirty="0">
                 <a:solidFill>
-                  <a:srgbClr val="92D050"/>
+                  <a:schemeClr val="bg1"/>
                 </a:solidFill>
               </a:rPr>
-              <a:t>9th Oct 2018</a:t>
+              <a:t>9</a:t>
             </a:r>
+            <a:r>
+              <a:rPr lang="en-US" sz="1600" b="1" baseline="30000" dirty="0">
+                <a:solidFill>
+                  <a:schemeClr val="bg1"/>
+                </a:solidFill>
+              </a:rPr>
+              <a:t>th</a:t>
+            </a:r>
+            <a:r>
+              <a:rPr lang="en-US" sz="1600" b="1" dirty="0">
+                <a:solidFill>
+                  <a:schemeClr val="bg1"/>
+                </a:solidFill>
+              </a:rPr>
+              <a:t> </a:t>
+            </a:r>
+            <a:r>
+              <a:rPr lang="en-US" sz="1600" b="1">
+                <a:solidFill>
+                  <a:schemeClr val="bg1"/>
+                </a:solidFill>
+              </a:rPr>
+              <a:t>Oct 2018</a:t>
+            </a:r>
+            <a:endParaRPr lang="en-US" sz="1600" b="1" dirty="0">
+              <a:solidFill>
+                <a:schemeClr val="bg1"/>
+              </a:solidFill>
+            </a:endParaRPr>
           </a:p>
         </p:txBody>
       </p:sp>
@@ -18390,7 +17991,7 @@
         </p:nvSpPr>
         <p:spPr>
           <a:xfrm>
-            <a:off x="1145044" y="1688176"/>
+            <a:off x="1195844" y="2206336"/>
             <a:ext cx="3331419" cy="3111690"/>
           </a:xfrm>
           <a:prstGeom prst="ellipse">
@@ -18446,96 +18047,205 @@
           </a:p>
         </p:txBody>
       </p:sp>
-      <p:pic>
-        <p:nvPicPr>
-          <p:cNvPr id="3" name="Picture 2">
+      <p:grpSp>
+        <p:nvGrpSpPr>
+          <p:cNvPr id="2" name="Group 1">
             <a:extLst>
               <a:ext uri="{FF2B5EF4-FFF2-40B4-BE49-F238E27FC236}">
-                <a16:creationId xmlns:a16="http://schemas.microsoft.com/office/drawing/2014/main" id="{D253C0E6-754B-AE44-88C7-EA9663A753B8}"/>
+                <a16:creationId xmlns:a16="http://schemas.microsoft.com/office/drawing/2014/main" id="{A0C45FDF-040A-7D46-8455-142D0CF815BD}"/>
               </a:ext>
             </a:extLst>
           </p:cNvPr>
-          <p:cNvPicPr>
-            <a:picLocks noChangeAspect="1"/>
-          </p:cNvPicPr>
+          <p:cNvGrpSpPr/>
           <p:nvPr/>
-        </p:nvPicPr>
-        <p:blipFill>
-          <a:blip r:embed="rId2"/>
-          <a:stretch>
-            <a:fillRect/>
-          </a:stretch>
-        </p:blipFill>
+        </p:nvGrpSpPr>
+        <p:grpSpPr>
+          <a:xfrm>
+            <a:off x="5172500" y="136481"/>
+            <a:ext cx="6960359" cy="6627122"/>
+            <a:chOff x="5172500" y="136481"/>
+            <a:chExt cx="6960359" cy="6627122"/>
+          </a:xfrm>
+        </p:grpSpPr>
+        <p:pic>
+          <p:nvPicPr>
+            <p:cNvPr id="3" name="Picture 2">
+              <a:extLst>
+                <a:ext uri="{FF2B5EF4-FFF2-40B4-BE49-F238E27FC236}">
+                  <a16:creationId xmlns:a16="http://schemas.microsoft.com/office/drawing/2014/main" id="{D253C0E6-754B-AE44-88C7-EA9663A753B8}"/>
+                </a:ext>
+              </a:extLst>
+            </p:cNvPr>
+            <p:cNvPicPr>
+              <a:picLocks noChangeAspect="1"/>
+            </p:cNvPicPr>
+            <p:nvPr/>
+          </p:nvPicPr>
+          <p:blipFill>
+            <a:blip r:embed="rId3"/>
+            <a:stretch>
+              <a:fillRect/>
+            </a:stretch>
+          </p:blipFill>
+          <p:spPr>
+            <a:xfrm>
+              <a:off x="5172500" y="136481"/>
+              <a:ext cx="6960359" cy="2263622"/>
+            </a:xfrm>
+            <a:prstGeom prst="rect">
+              <a:avLst/>
+            </a:prstGeom>
+          </p:spPr>
+        </p:pic>
+        <p:pic>
+          <p:nvPicPr>
+            <p:cNvPr id="5" name="Picture 4">
+              <a:extLst>
+                <a:ext uri="{FF2B5EF4-FFF2-40B4-BE49-F238E27FC236}">
+                  <a16:creationId xmlns:a16="http://schemas.microsoft.com/office/drawing/2014/main" id="{4B871A42-B73A-9E49-9507-0229B7E77B57}"/>
+                </a:ext>
+              </a:extLst>
+            </p:cNvPr>
+            <p:cNvPicPr>
+              <a:picLocks noChangeAspect="1"/>
+            </p:cNvPicPr>
+            <p:nvPr/>
+          </p:nvPicPr>
+          <p:blipFill>
+            <a:blip r:embed="rId4"/>
+            <a:stretch>
+              <a:fillRect/>
+            </a:stretch>
+          </p:blipFill>
+          <p:spPr>
+            <a:xfrm>
+              <a:off x="6233893" y="2456919"/>
+              <a:ext cx="5889867" cy="2274707"/>
+            </a:xfrm>
+            <a:prstGeom prst="rect">
+              <a:avLst/>
+            </a:prstGeom>
+          </p:spPr>
+        </p:pic>
+        <p:pic>
+          <p:nvPicPr>
+            <p:cNvPr id="7" name="Picture 6">
+              <a:extLst>
+                <a:ext uri="{FF2B5EF4-FFF2-40B4-BE49-F238E27FC236}">
+                  <a16:creationId xmlns:a16="http://schemas.microsoft.com/office/drawing/2014/main" id="{C869DB1C-CD82-4044-A15C-A3CDC9F64F2E}"/>
+                </a:ext>
+              </a:extLst>
+            </p:cNvPr>
+            <p:cNvPicPr>
+              <a:picLocks noChangeAspect="1"/>
+            </p:cNvPicPr>
+            <p:nvPr/>
+          </p:nvPicPr>
+          <p:blipFill>
+            <a:blip r:embed="rId5"/>
+            <a:stretch>
+              <a:fillRect/>
+            </a:stretch>
+          </p:blipFill>
+          <p:spPr>
+            <a:xfrm>
+              <a:off x="7137778" y="4799866"/>
+              <a:ext cx="4967786" cy="1963737"/>
+            </a:xfrm>
+            <a:prstGeom prst="rect">
+              <a:avLst/>
+            </a:prstGeom>
+          </p:spPr>
+        </p:pic>
+      </p:grpSp>
+      <p:sp>
+        <p:nvSpPr>
+          <p:cNvPr id="6" name="TextBox 5">
+            <a:extLst>
+              <a:ext uri="{FF2B5EF4-FFF2-40B4-BE49-F238E27FC236}">
+                <a16:creationId xmlns:a16="http://schemas.microsoft.com/office/drawing/2014/main" id="{140BDE0A-FAA4-4841-854D-7F1B2B5B36F5}"/>
+              </a:ext>
+            </a:extLst>
+          </p:cNvPr>
+          <p:cNvSpPr txBox="1"/>
+          <p:nvPr/>
+        </p:nvSpPr>
         <p:spPr>
           <a:xfrm>
-            <a:off x="5172500" y="136481"/>
-            <a:ext cx="6960359" cy="2263622"/>
+            <a:off x="0" y="416560"/>
+            <a:ext cx="5172500" cy="1077218"/>
           </a:xfrm>
           <a:prstGeom prst="rect">
             <a:avLst/>
           </a:prstGeom>
+          <a:noFill/>
         </p:spPr>
-      </p:pic>
-      <p:pic>
-        <p:nvPicPr>
-          <p:cNvPr id="5" name="Picture 4">
+        <p:txBody>
+          <a:bodyPr wrap="square" rtlCol="0">
+            <a:spAutoFit/>
+          </a:bodyPr>
+          <a:lstStyle/>
+          <a:p>
+            <a:pPr algn="ctr"/>
+            <a:r>
+              <a:rPr lang="en-US" sz="3200" dirty="0"/>
+              <a:t>Top Visited Page By Active Customers</a:t>
+            </a:r>
+          </a:p>
+        </p:txBody>
+      </p:sp>
+      <p:sp>
+        <p:nvSpPr>
+          <p:cNvPr id="8" name="TextBox 7">
             <a:extLst>
               <a:ext uri="{FF2B5EF4-FFF2-40B4-BE49-F238E27FC236}">
-                <a16:creationId xmlns:a16="http://schemas.microsoft.com/office/drawing/2014/main" id="{4B871A42-B73A-9E49-9507-0229B7E77B57}"/>
+                <a16:creationId xmlns:a16="http://schemas.microsoft.com/office/drawing/2014/main" id="{6A51414C-C338-9343-BC4E-A6FD7C920ECC}"/>
               </a:ext>
             </a:extLst>
           </p:cNvPr>
-          <p:cNvPicPr>
-            <a:picLocks noChangeAspect="1"/>
-          </p:cNvPicPr>
+          <p:cNvSpPr txBox="1"/>
           <p:nvPr/>
-        </p:nvPicPr>
-        <p:blipFill>
-          <a:blip r:embed="rId3"/>
-          <a:stretch>
-            <a:fillRect/>
-          </a:stretch>
-        </p:blipFill>
+        </p:nvSpPr>
         <p:spPr>
           <a:xfrm>
-            <a:off x="6233893" y="2456919"/>
-            <a:ext cx="5889867" cy="2274707"/>
+            <a:off x="11504558" y="6566748"/>
+            <a:ext cx="668887" cy="261610"/>
           </a:xfrm>
           <a:prstGeom prst="rect">
             <a:avLst/>
           </a:prstGeom>
+          <a:noFill/>
         </p:spPr>
-      </p:pic>
-      <p:pic>
-        <p:nvPicPr>
-          <p:cNvPr id="7" name="Picture 6">
-            <a:extLst>
-              <a:ext uri="{FF2B5EF4-FFF2-40B4-BE49-F238E27FC236}">
-                <a16:creationId xmlns:a16="http://schemas.microsoft.com/office/drawing/2014/main" id="{C869DB1C-CD82-4044-A15C-A3CDC9F64F2E}"/>
-              </a:ext>
-            </a:extLst>
-          </p:cNvPr>
-          <p:cNvPicPr>
-            <a:picLocks noChangeAspect="1"/>
-          </p:cNvPicPr>
-          <p:nvPr/>
-        </p:nvPicPr>
-        <p:blipFill>
-          <a:blip r:embed="rId4"/>
-          <a:stretch>
-            <a:fillRect/>
-          </a:stretch>
-        </p:blipFill>
-        <p:spPr>
-          <a:xfrm>
-            <a:off x="7137778" y="4799866"/>
-            <a:ext cx="4967786" cy="1963737"/>
-          </a:xfrm>
-          <a:prstGeom prst="rect">
-            <a:avLst/>
-          </a:prstGeom>
-        </p:spPr>
-      </p:pic>
+        <p:txBody>
+          <a:bodyPr wrap="square" rtlCol="0">
+            <a:spAutoFit/>
+          </a:bodyPr>
+          <a:lstStyle/>
+          <a:p>
+            <a:r>
+              <a:rPr lang="en-US" sz="1100" dirty="0">
+                <a:solidFill>
+                  <a:schemeClr val="bg1"/>
+                </a:solidFill>
+              </a:rPr>
+              <a:t>Slide: </a:t>
+            </a:r>
+            <a:fld id="{E81B1F43-2893-C542-AE5A-0BE0AF189F44}" type="slidenum">
+              <a:rPr lang="en-US" sz="1100" smtClean="0">
+                <a:solidFill>
+                  <a:schemeClr val="bg1"/>
+                </a:solidFill>
+              </a:rPr>
+              <a:t>10</a:t>
+            </a:fld>
+            <a:endParaRPr lang="en-US" sz="1100" dirty="0">
+              <a:solidFill>
+                <a:schemeClr val="bg1"/>
+              </a:solidFill>
+            </a:endParaRPr>
+          </a:p>
+        </p:txBody>
+      </p:sp>
     </p:spTree>
     <p:extLst>
       <p:ext uri="{BB962C8B-B14F-4D97-AF65-F5344CB8AC3E}">
@@ -18620,7 +18330,7 @@
           <p:nvPr>
             <p:extLst>
               <p:ext uri="{D42A27DB-BD31-4B8C-83A1-F6EECF244321}">
-                <p14:modId xmlns:p14="http://schemas.microsoft.com/office/powerpoint/2010/main" val="1322430496"/>
+                <p14:modId xmlns:p14="http://schemas.microsoft.com/office/powerpoint/2010/main" val="1424715872"/>
               </p:ext>
             </p:extLst>
           </p:nvPr>
@@ -18698,6 +18408,46 @@
           </a:p>
         </p:txBody>
       </p:sp>
+      <p:sp>
+        <p:nvSpPr>
+          <p:cNvPr id="5" name="TextBox 4">
+            <a:extLst>
+              <a:ext uri="{FF2B5EF4-FFF2-40B4-BE49-F238E27FC236}">
+                <a16:creationId xmlns:a16="http://schemas.microsoft.com/office/drawing/2014/main" id="{E806CD5C-276B-4740-94A8-37459D357D2B}"/>
+              </a:ext>
+            </a:extLst>
+          </p:cNvPr>
+          <p:cNvSpPr txBox="1"/>
+          <p:nvPr/>
+        </p:nvSpPr>
+        <p:spPr>
+          <a:xfrm>
+            <a:off x="11564468" y="6597228"/>
+            <a:ext cx="668887" cy="261610"/>
+          </a:xfrm>
+          <a:prstGeom prst="rect">
+            <a:avLst/>
+          </a:prstGeom>
+          <a:noFill/>
+        </p:spPr>
+        <p:txBody>
+          <a:bodyPr wrap="square" rtlCol="0">
+            <a:spAutoFit/>
+          </a:bodyPr>
+          <a:lstStyle/>
+          <a:p>
+            <a:r>
+              <a:rPr lang="en-US" sz="1100" dirty="0"/>
+              <a:t>Slide: </a:t>
+            </a:r>
+            <a:fld id="{E81B1F43-2893-C542-AE5A-0BE0AF189F44}" type="slidenum">
+              <a:rPr lang="en-US" sz="1100" smtClean="0"/>
+              <a:t>11</a:t>
+            </a:fld>
+            <a:endParaRPr lang="en-US" sz="1100" dirty="0"/>
+          </a:p>
+        </p:txBody>
+      </p:sp>
     </p:spTree>
     <p:extLst>
       <p:ext uri="{BB962C8B-B14F-4D97-AF65-F5344CB8AC3E}">
@@ -18757,18 +18507,19 @@
           <a:lstStyle/>
           <a:p>
             <a:r>
-              <a:rPr lang="en-US" sz="3200" dirty="0"/>
-              <a:t>Out of 88 customers we have 42 Active Customers, we can say the company is positively geared towards the expected goal of </a:t>
+              <a:rPr lang="en-US" sz="2000" dirty="0"/>
+              <a:t>Out of 88 customers we have 42 Active Customers, we can say the company is positively geared towards the expected goal of converting  18 customers by end of trial period. </a:t>
             </a:r>
+            <a:br>
+              <a:rPr lang="en-US" sz="2000" dirty="0"/>
+            </a:br>
+            <a:br>
+              <a:rPr lang="en-US" sz="2000" dirty="0"/>
+            </a:br>
             <a:r>
-              <a:rPr lang="en-US" sz="3200"/>
-              <a:t>converting  18 </a:t>
+              <a:rPr lang="en-US" sz="2000" dirty="0"/>
+              <a:t>We show confidence on numbers in the both our hypothesis but cannot conclude yet till we acquire other related data and do more exploration on it.</a:t>
             </a:r>
-            <a:r>
-              <a:rPr lang="en-US" sz="3200" dirty="0"/>
-              <a:t>customers by end of trial period.</a:t>
-            </a:r>
-            <a:endParaRPr lang="en-US" sz="4000" dirty="0"/>
           </a:p>
         </p:txBody>
       </p:sp>
@@ -18978,7 +18729,7 @@
                 <a:buNone/>
               </a:pPr>
               <a:r>
-                <a:rPr lang="en-US" sz="3000" kern="1200" dirty="0">
+                <a:rPr lang="en-US" sz="2800" kern="1200" dirty="0">
                   <a:solidFill>
                     <a:schemeClr val="bg1"/>
                   </a:solidFill>
@@ -18989,7 +18740,7 @@
             <a:p>
               <a:pPr lvl="0"/>
               <a:r>
-                <a:rPr lang="en-US" sz="2400" dirty="0">
+                <a:rPr lang="en-US" sz="2000" dirty="0">
                   <a:solidFill>
                     <a:schemeClr val="bg1"/>
                   </a:solidFill>
@@ -18997,7 +18748,7 @@
                 <a:t>Marketing &amp; Business Unit heads has </a:t>
               </a:r>
               <a:r>
-                <a:rPr lang="en-US" sz="2400" b="1" dirty="0">
+                <a:rPr lang="en-US" sz="2000" b="1" dirty="0">
                   <a:solidFill>
                     <a:srgbClr val="FF0000"/>
                   </a:solidFill>
@@ -19005,7 +18756,7 @@
                 <a:t>20%</a:t>
               </a:r>
               <a:r>
-                <a:rPr lang="en-US" sz="2400" dirty="0">
+                <a:rPr lang="en-US" sz="2000" dirty="0">
                   <a:solidFill>
                     <a:srgbClr val="FF0000"/>
                   </a:solidFill>
@@ -19013,7 +18764,7 @@
                 <a:t> </a:t>
               </a:r>
               <a:r>
-                <a:rPr lang="en-US" sz="2400" dirty="0">
+                <a:rPr lang="en-US" sz="2000" dirty="0">
                   <a:solidFill>
                     <a:schemeClr val="bg1"/>
                   </a:solidFill>
@@ -19021,7 +18772,7 @@
                 <a:t>conversion expectation. </a:t>
               </a:r>
               <a:r>
-                <a:rPr lang="en-US" sz="2400" dirty="0">
+                <a:rPr lang="en-US" sz="2000" dirty="0">
                   <a:solidFill>
                     <a:srgbClr val="FF0000"/>
                   </a:solidFill>
@@ -19029,7 +18780,7 @@
                 <a:t>(</a:t>
               </a:r>
               <a:r>
-                <a:rPr lang="en-US" sz="2400" b="1" dirty="0">
+                <a:rPr lang="en-US" sz="2000" b="1" dirty="0">
                   <a:solidFill>
                     <a:srgbClr val="FF0000"/>
                   </a:solidFill>
@@ -19037,13 +18788,31 @@
                 <a:t>Translate to 18 customers</a:t>
               </a:r>
               <a:r>
-                <a:rPr lang="en-US" sz="2400" dirty="0">
+                <a:rPr lang="en-US" sz="2000" dirty="0">
                   <a:solidFill>
                     <a:srgbClr val="FF0000"/>
                   </a:solidFill>
                 </a:rPr>
                 <a:t>)</a:t>
               </a:r>
+            </a:p>
+            <a:p>
+              <a:r>
+                <a:rPr lang="en-US" sz="2000" dirty="0">
+                  <a:solidFill>
+                    <a:prstClr val="black"/>
+                  </a:solidFill>
+                </a:rPr>
+                <a:t>Data Package is more popular out of 3 services</a:t>
+              </a:r>
+            </a:p>
+            <a:p>
+              <a:pPr lvl="0"/>
+              <a:endParaRPr lang="en-US" sz="2000" dirty="0">
+                <a:solidFill>
+                  <a:srgbClr val="FF0000"/>
+                </a:solidFill>
+              </a:endParaRPr>
             </a:p>
           </p:txBody>
         </p:sp>
@@ -19200,7 +18969,7 @@
                 <a:buNone/>
               </a:pPr>
               <a:r>
-                <a:rPr lang="en-US" sz="2400" dirty="0">
+                <a:rPr lang="en-US" sz="2000" dirty="0">
                   <a:solidFill>
                     <a:schemeClr val="bg1"/>
                   </a:solidFill>
@@ -19208,7 +18977,7 @@
                 <a:t>Less than </a:t>
               </a:r>
               <a:r>
-                <a:rPr lang="en-US" sz="2400" b="1" dirty="0">
+                <a:rPr lang="en-US" sz="2000" b="1" dirty="0">
                   <a:solidFill>
                     <a:srgbClr val="FF0000"/>
                   </a:solidFill>
@@ -19216,7 +18985,7 @@
                 <a:t>18 customers</a:t>
               </a:r>
               <a:r>
-                <a:rPr lang="en-US" sz="2400" dirty="0">
+                <a:rPr lang="en-US" sz="2000" dirty="0">
                   <a:solidFill>
                     <a:srgbClr val="FF0000"/>
                   </a:solidFill>
@@ -19224,12 +18993,34 @@
                 <a:t> </a:t>
               </a:r>
               <a:r>
-                <a:rPr lang="en-US" sz="2400" dirty="0">
+                <a:rPr lang="en-US" sz="2000" dirty="0">
                   <a:solidFill>
                     <a:schemeClr val="bg1"/>
                   </a:solidFill>
                 </a:rPr>
                 <a:t>converted</a:t>
+              </a:r>
+            </a:p>
+            <a:p>
+              <a:pPr marL="0" lvl="0" indent="0" algn="l" defTabSz="1244600">
+                <a:lnSpc>
+                  <a:spcPct val="90000"/>
+                </a:lnSpc>
+                <a:spcBef>
+                  <a:spcPct val="0"/>
+                </a:spcBef>
+                <a:spcAft>
+                  <a:spcPct val="35000"/>
+                </a:spcAft>
+                <a:buNone/>
+              </a:pPr>
+              <a:r>
+                <a:rPr lang="en-US" sz="2000" dirty="0">
+                  <a:solidFill>
+                    <a:schemeClr val="bg1"/>
+                  </a:solidFill>
+                </a:rPr>
+                <a:t>Data Package is not popular</a:t>
               </a:r>
             </a:p>
           </p:txBody>
@@ -19463,6 +19254,46 @@
           </a:p>
         </p:txBody>
       </p:sp>
+      <p:sp>
+        <p:nvSpPr>
+          <p:cNvPr id="15" name="TextBox 14">
+            <a:extLst>
+              <a:ext uri="{FF2B5EF4-FFF2-40B4-BE49-F238E27FC236}">
+                <a16:creationId xmlns:a16="http://schemas.microsoft.com/office/drawing/2014/main" id="{60A68D88-526A-F043-A5AF-C156D23AE97B}"/>
+              </a:ext>
+            </a:extLst>
+          </p:cNvPr>
+          <p:cNvSpPr txBox="1"/>
+          <p:nvPr/>
+        </p:nvSpPr>
+        <p:spPr>
+          <a:xfrm>
+            <a:off x="11532937" y="6597228"/>
+            <a:ext cx="668887" cy="261610"/>
+          </a:xfrm>
+          <a:prstGeom prst="rect">
+            <a:avLst/>
+          </a:prstGeom>
+          <a:noFill/>
+        </p:spPr>
+        <p:txBody>
+          <a:bodyPr wrap="square" rtlCol="0">
+            <a:spAutoFit/>
+          </a:bodyPr>
+          <a:lstStyle/>
+          <a:p>
+            <a:r>
+              <a:rPr lang="en-US" sz="1100" dirty="0"/>
+              <a:t>Slide: </a:t>
+            </a:r>
+            <a:fld id="{E81B1F43-2893-C542-AE5A-0BE0AF189F44}" type="slidenum">
+              <a:rPr lang="en-US" sz="1100" smtClean="0"/>
+              <a:t>12</a:t>
+            </a:fld>
+            <a:endParaRPr lang="en-US" sz="1100" dirty="0"/>
+          </a:p>
+        </p:txBody>
+      </p:sp>
     </p:spTree>
     <p:extLst>
       <p:ext uri="{BB962C8B-B14F-4D97-AF65-F5344CB8AC3E}">
@@ -19477,6 +19308,206 @@
 </file>
 
 <file path=ppt/slides/slide13.xml><?xml version="1.0" encoding="utf-8"?>
+<p:sld xmlns:a="http://schemas.openxmlformats.org/drawingml/2006/main" xmlns:r="http://schemas.openxmlformats.org/officeDocument/2006/relationships" xmlns:p="http://schemas.openxmlformats.org/presentationml/2006/main">
+  <p:cSld>
+    <p:spTree>
+      <p:nvGrpSpPr>
+        <p:cNvPr id="1" name=""/>
+        <p:cNvGrpSpPr/>
+        <p:nvPr/>
+      </p:nvGrpSpPr>
+      <p:grpSpPr>
+        <a:xfrm>
+          <a:off x="0" y="0"/>
+          <a:ext cx="0" cy="0"/>
+          <a:chOff x="0" y="0"/>
+          <a:chExt cx="0" cy="0"/>
+        </a:xfrm>
+      </p:grpSpPr>
+      <p:sp>
+        <p:nvSpPr>
+          <p:cNvPr id="2" name="Title 1">
+            <a:extLst>
+              <a:ext uri="{FF2B5EF4-FFF2-40B4-BE49-F238E27FC236}">
+                <a16:creationId xmlns:a16="http://schemas.microsoft.com/office/drawing/2014/main" id="{CBFCDA01-E67A-9346-A8DE-FF552D82F9BE}"/>
+              </a:ext>
+            </a:extLst>
+          </p:cNvPr>
+          <p:cNvSpPr>
+            <a:spLocks noGrp="1"/>
+          </p:cNvSpPr>
+          <p:nvPr>
+            <p:ph type="title"/>
+          </p:nvPr>
+        </p:nvSpPr>
+        <p:spPr>
+          <a:xfrm>
+            <a:off x="238993" y="0"/>
+            <a:ext cx="10515600" cy="1325563"/>
+          </a:xfrm>
+        </p:spPr>
+        <p:txBody>
+          <a:bodyPr>
+            <a:normAutofit/>
+          </a:bodyPr>
+          <a:lstStyle/>
+          <a:p>
+            <a:r>
+              <a:rPr lang="en-US" sz="2800" b="1" dirty="0"/>
+              <a:t>From The Desk Of Analysis Team:  Recommendations </a:t>
+            </a:r>
+          </a:p>
+        </p:txBody>
+      </p:sp>
+      <p:sp>
+        <p:nvSpPr>
+          <p:cNvPr id="3" name="Content Placeholder 2">
+            <a:extLst>
+              <a:ext uri="{FF2B5EF4-FFF2-40B4-BE49-F238E27FC236}">
+                <a16:creationId xmlns:a16="http://schemas.microsoft.com/office/drawing/2014/main" id="{073270C3-BA42-EE43-BB66-7FC5226AC805}"/>
+              </a:ext>
+            </a:extLst>
+          </p:cNvPr>
+          <p:cNvSpPr>
+            <a:spLocks noGrp="1"/>
+          </p:cNvSpPr>
+          <p:nvPr>
+            <p:ph idx="1"/>
+          </p:nvPr>
+        </p:nvSpPr>
+        <p:spPr>
+          <a:xfrm>
+            <a:off x="838200" y="1663065"/>
+            <a:ext cx="10515600" cy="4351338"/>
+          </a:xfrm>
+        </p:spPr>
+        <p:txBody>
+          <a:bodyPr>
+            <a:normAutofit/>
+          </a:bodyPr>
+          <a:lstStyle/>
+          <a:p>
+            <a:endParaRPr lang="en-US" sz="2000" dirty="0"/>
+          </a:p>
+          <a:p>
+            <a:r>
+              <a:rPr lang="en-US" sz="2000" dirty="0"/>
+              <a:t>Customers Session count matters, but the Average Active Time they spend on session is more definitive for being a potential.</a:t>
+            </a:r>
+          </a:p>
+          <a:p>
+            <a:r>
+              <a:rPr lang="en-US" sz="2000" dirty="0"/>
+              <a:t>“Data Package” is the most popular service, resources should be aligned and geared towards addressing any  clarification/accessibility/issues etc. that may arise.</a:t>
+            </a:r>
+          </a:p>
+          <a:p>
+            <a:r>
+              <a:rPr lang="en-US" sz="2000" dirty="0"/>
+              <a:t>Company46, Company38, Company25 are solely using “Data Logging” Service, finding their use case to attract other customers who may have similar use cases can be explored.</a:t>
+            </a:r>
+          </a:p>
+          <a:p>
+            <a:r>
+              <a:rPr lang="en-US" sz="2000" dirty="0" err="1"/>
+              <a:t>dataType</a:t>
+            </a:r>
+            <a:r>
+              <a:rPr lang="en-US" sz="2000" dirty="0"/>
+              <a:t>-UI/#/</a:t>
+            </a:r>
+            <a:r>
+              <a:rPr lang="en-US" sz="2000" dirty="0" err="1"/>
+              <a:t>blueprint-ui;ash</a:t>
+            </a:r>
+            <a:r>
+              <a:rPr lang="en-US" sz="2000" dirty="0"/>
+              <a:t>=/blueprint is the top visited page. Team should strive to keep this page optimized for user, effective load balancing be done, keep the page more engaging and seek required response on this page as required.</a:t>
+            </a:r>
+          </a:p>
+          <a:p>
+            <a:r>
+              <a:rPr lang="en-US" sz="2000" dirty="0"/>
+              <a:t>Align resources to handle Chrome and Desktop related issues on priority compared to other browsers or devices.</a:t>
+            </a:r>
+          </a:p>
+          <a:p>
+            <a:endParaRPr lang="en-US" sz="2000" dirty="0"/>
+          </a:p>
+          <a:p>
+            <a:endParaRPr lang="en-US" sz="2000" dirty="0"/>
+          </a:p>
+          <a:p>
+            <a:endParaRPr lang="en-US" sz="2000" dirty="0"/>
+          </a:p>
+          <a:p>
+            <a:pPr marL="0" indent="0">
+              <a:buNone/>
+            </a:pPr>
+            <a:endParaRPr lang="en-US" sz="2000" dirty="0"/>
+          </a:p>
+          <a:p>
+            <a:endParaRPr lang="en-US" sz="2000" dirty="0"/>
+          </a:p>
+          <a:p>
+            <a:endParaRPr lang="en-US" sz="2000" dirty="0"/>
+          </a:p>
+        </p:txBody>
+      </p:sp>
+      <p:sp>
+        <p:nvSpPr>
+          <p:cNvPr id="4" name="TextBox 3">
+            <a:extLst>
+              <a:ext uri="{FF2B5EF4-FFF2-40B4-BE49-F238E27FC236}">
+                <a16:creationId xmlns:a16="http://schemas.microsoft.com/office/drawing/2014/main" id="{98310CD6-2D92-AF41-A336-40173AF59367}"/>
+              </a:ext>
+            </a:extLst>
+          </p:cNvPr>
+          <p:cNvSpPr txBox="1"/>
+          <p:nvPr/>
+        </p:nvSpPr>
+        <p:spPr>
+          <a:xfrm>
+            <a:off x="11534652" y="6596389"/>
+            <a:ext cx="668887" cy="261610"/>
+          </a:xfrm>
+          <a:prstGeom prst="rect">
+            <a:avLst/>
+          </a:prstGeom>
+          <a:noFill/>
+        </p:spPr>
+        <p:txBody>
+          <a:bodyPr wrap="square" rtlCol="0">
+            <a:spAutoFit/>
+          </a:bodyPr>
+          <a:lstStyle/>
+          <a:p>
+            <a:r>
+              <a:rPr lang="en-US" sz="1100" dirty="0"/>
+              <a:t>Slide: </a:t>
+            </a:r>
+            <a:fld id="{E81B1F43-2893-C542-AE5A-0BE0AF189F44}" type="slidenum">
+              <a:rPr lang="en-US" sz="1100" smtClean="0"/>
+              <a:t>13</a:t>
+            </a:fld>
+            <a:endParaRPr lang="en-US" sz="1100" dirty="0"/>
+          </a:p>
+        </p:txBody>
+      </p:sp>
+    </p:spTree>
+    <p:extLst>
+      <p:ext uri="{BB962C8B-B14F-4D97-AF65-F5344CB8AC3E}">
+        <p14:creationId xmlns:p14="http://schemas.microsoft.com/office/powerpoint/2010/main" val="2621526095"/>
+      </p:ext>
+    </p:extLst>
+  </p:cSld>
+  <p:clrMapOvr>
+    <a:masterClrMapping/>
+  </p:clrMapOvr>
+</p:sld>
+</file>
+
+<file path=ppt/slides/slide14.xml><?xml version="1.0" encoding="utf-8"?>
 <p:sld xmlns:a="http://schemas.openxmlformats.org/drawingml/2006/main" xmlns:r="http://schemas.openxmlformats.org/officeDocument/2006/relationships" xmlns:p="http://schemas.openxmlformats.org/presentationml/2006/main">
   <p:cSld>
     <p:spTree>
@@ -19548,7 +19579,7 @@
         <p:spPr/>
         <p:txBody>
           <a:bodyPr>
-            <a:normAutofit fontScale="92500" lnSpcReduction="20000"/>
+            <a:normAutofit lnSpcReduction="10000"/>
           </a:bodyPr>
           <a:lstStyle/>
           <a:p>
@@ -19596,7 +19627,7 @@
             </a:pPr>
             <a:r>
               <a:rPr lang="en-US" dirty="0"/>
-              <a:t>	 </a:t>
+              <a:t>	</a:t>
             </a:r>
             <a:r>
               <a:rPr lang="en-US" sz="1600" i="1" dirty="0">
@@ -19620,23 +19651,7 @@
                   <a:srgbClr val="FFC000"/>
                 </a:solidFill>
               </a:rPr>
-              <a:t> of the </a:t>
-            </a:r>
-            <a:r>
-              <a:rPr lang="en-US" sz="1600" i="1" dirty="0" err="1">
-                <a:solidFill>
-                  <a:srgbClr val="FFC000"/>
-                </a:solidFill>
-              </a:rPr>
-              <a:t>Fullstory</a:t>
-            </a:r>
-            <a:r>
-              <a:rPr lang="en-US" sz="1600" i="1" dirty="0">
-                <a:solidFill>
-                  <a:srgbClr val="FFC000"/>
-                </a:solidFill>
-              </a:rPr>
-              <a:t> data exports</a:t>
+              <a:t> of the Fullstory data exports</a:t>
             </a:r>
           </a:p>
           <a:p>
@@ -19664,13 +19679,13 @@
             </a:r>
             <a:r>
               <a:rPr lang="en-US" dirty="0"/>
-              <a:t>, list reduce, weightage rank etc. as our favorite tools</a:t>
+              <a:t>, list reduce, pivot, weightage rank, function etc. as our favorite tools</a:t>
             </a:r>
           </a:p>
           <a:p>
             <a:r>
               <a:rPr lang="en-US" dirty="0"/>
-              <a:t>We explore new library for giving color effect to our charts:</a:t>
+              <a:t>We explore new module for giving color effect to our charts:</a:t>
             </a:r>
           </a:p>
           <a:p>
@@ -19688,12 +19703,6 @@
             </a:r>
           </a:p>
           <a:p>
-            <a:r>
-              <a:rPr lang="en-US" dirty="0"/>
-              <a:t>And much more…</a:t>
-            </a:r>
-          </a:p>
-          <a:p>
             <a:endParaRPr lang="en-US" dirty="0"/>
           </a:p>
           <a:p>
@@ -19701,6 +19710,46 @@
               <a:buNone/>
             </a:pPr>
             <a:endParaRPr lang="en-US" dirty="0"/>
+          </a:p>
+        </p:txBody>
+      </p:sp>
+      <p:sp>
+        <p:nvSpPr>
+          <p:cNvPr id="4" name="TextBox 3">
+            <a:extLst>
+              <a:ext uri="{FF2B5EF4-FFF2-40B4-BE49-F238E27FC236}">
+                <a16:creationId xmlns:a16="http://schemas.microsoft.com/office/drawing/2014/main" id="{C9333F72-20F9-394C-AE22-EBD597A478C6}"/>
+              </a:ext>
+            </a:extLst>
+          </p:cNvPr>
+          <p:cNvSpPr txBox="1"/>
+          <p:nvPr/>
+        </p:nvSpPr>
+        <p:spPr>
+          <a:xfrm>
+            <a:off x="11574978" y="6597228"/>
+            <a:ext cx="668887" cy="261610"/>
+          </a:xfrm>
+          <a:prstGeom prst="rect">
+            <a:avLst/>
+          </a:prstGeom>
+          <a:noFill/>
+        </p:spPr>
+        <p:txBody>
+          <a:bodyPr wrap="square" rtlCol="0">
+            <a:spAutoFit/>
+          </a:bodyPr>
+          <a:lstStyle/>
+          <a:p>
+            <a:r>
+              <a:rPr lang="en-US" sz="1100" dirty="0"/>
+              <a:t>Slide: </a:t>
+            </a:r>
+            <a:fld id="{E81B1F43-2893-C542-AE5A-0BE0AF189F44}" type="slidenum">
+              <a:rPr lang="en-US" sz="1100" smtClean="0"/>
+              <a:t>14</a:t>
+            </a:fld>
+            <a:endParaRPr lang="en-US" sz="1100" dirty="0"/>
           </a:p>
         </p:txBody>
       </p:sp>
@@ -19717,7 +19766,7 @@
 </p:sld>
 </file>
 
-<file path=ppt/slides/slide14.xml><?xml version="1.0" encoding="utf-8"?>
+<file path=ppt/slides/slide15.xml><?xml version="1.0" encoding="utf-8"?>
 <p:sld xmlns:a="http://schemas.openxmlformats.org/drawingml/2006/main" xmlns:r="http://schemas.openxmlformats.org/officeDocument/2006/relationships" xmlns:p="http://schemas.openxmlformats.org/presentationml/2006/main">
   <p:cSld>
     <p:spTree>
@@ -19901,45 +19950,6 @@
       </p:grpSp>
       <p:sp>
         <p:nvSpPr>
-          <p:cNvPr id="4" name="TextBox 3">
-            <a:extLst>
-              <a:ext uri="{FF2B5EF4-FFF2-40B4-BE49-F238E27FC236}">
-                <a16:creationId xmlns:a16="http://schemas.microsoft.com/office/drawing/2014/main" id="{3D716B05-61B0-A54C-940E-19E6CDF83821}"/>
-              </a:ext>
-            </a:extLst>
-          </p:cNvPr>
-          <p:cNvSpPr txBox="1"/>
-          <p:nvPr/>
-        </p:nvSpPr>
-        <p:spPr>
-          <a:xfrm>
-            <a:off x="11302013" y="6573559"/>
-            <a:ext cx="928459" cy="261610"/>
-          </a:xfrm>
-          <a:prstGeom prst="rect">
-            <a:avLst/>
-          </a:prstGeom>
-          <a:noFill/>
-        </p:spPr>
-        <p:txBody>
-          <a:bodyPr wrap="none" rtlCol="0">
-            <a:spAutoFit/>
-          </a:bodyPr>
-          <a:lstStyle/>
-          <a:p>
-            <a:r>
-              <a:rPr lang="en-US" sz="1050" dirty="0">
-                <a:solidFill>
-                  <a:srgbClr val="92D050"/>
-                </a:solidFill>
-              </a:rPr>
-              <a:t>9th Oct 2018</a:t>
-            </a:r>
-          </a:p>
-        </p:txBody>
-      </p:sp>
-      <p:sp>
-        <p:nvSpPr>
           <p:cNvPr id="15" name="TextBox 14">
             <a:extLst>
               <a:ext uri="{FF2B5EF4-FFF2-40B4-BE49-F238E27FC236}">
@@ -19970,6 +19980,46 @@
               <a:rPr lang="en-US" sz="2800" dirty="0"/>
               <a:t>We are now open for Q &amp; A </a:t>
             </a:r>
+          </a:p>
+        </p:txBody>
+      </p:sp>
+      <p:sp>
+        <p:nvSpPr>
+          <p:cNvPr id="9" name="TextBox 8">
+            <a:extLst>
+              <a:ext uri="{FF2B5EF4-FFF2-40B4-BE49-F238E27FC236}">
+                <a16:creationId xmlns:a16="http://schemas.microsoft.com/office/drawing/2014/main" id="{295C7BAF-A537-2B4E-A214-67EC7F3ABB5B}"/>
+              </a:ext>
+            </a:extLst>
+          </p:cNvPr>
+          <p:cNvSpPr txBox="1"/>
+          <p:nvPr/>
+        </p:nvSpPr>
+        <p:spPr>
+          <a:xfrm>
+            <a:off x="11554308" y="6597228"/>
+            <a:ext cx="668887" cy="261610"/>
+          </a:xfrm>
+          <a:prstGeom prst="rect">
+            <a:avLst/>
+          </a:prstGeom>
+          <a:noFill/>
+        </p:spPr>
+        <p:txBody>
+          <a:bodyPr wrap="square" rtlCol="0">
+            <a:spAutoFit/>
+          </a:bodyPr>
+          <a:lstStyle/>
+          <a:p>
+            <a:r>
+              <a:rPr lang="en-US" sz="1100" dirty="0"/>
+              <a:t>Slide: </a:t>
+            </a:r>
+            <a:fld id="{E81B1F43-2893-C542-AE5A-0BE0AF189F44}" type="slidenum">
+              <a:rPr lang="en-US" sz="1100" smtClean="0"/>
+              <a:t>15</a:t>
+            </a:fld>
+            <a:endParaRPr lang="en-US" sz="1100" dirty="0"/>
           </a:p>
         </p:txBody>
       </p:sp>
@@ -20160,7 +20210,7 @@
           <p:nvPr>
             <p:extLst>
               <p:ext uri="{D42A27DB-BD31-4B8C-83A1-F6EECF244321}">
-                <p14:modId xmlns:p14="http://schemas.microsoft.com/office/powerpoint/2010/main" val="3345788701"/>
+                <p14:modId xmlns:p14="http://schemas.microsoft.com/office/powerpoint/2010/main" val="3732995377"/>
               </p:ext>
             </p:extLst>
           </p:nvPr>
@@ -20232,6 +20282,46 @@
           </a:p>
         </p:txBody>
       </p:sp>
+      <p:sp>
+        <p:nvSpPr>
+          <p:cNvPr id="8" name="TextBox 7">
+            <a:extLst>
+              <a:ext uri="{FF2B5EF4-FFF2-40B4-BE49-F238E27FC236}">
+                <a16:creationId xmlns:a16="http://schemas.microsoft.com/office/drawing/2014/main" id="{11691ED2-A374-2643-80FF-D7E2F523EA21}"/>
+              </a:ext>
+            </a:extLst>
+          </p:cNvPr>
+          <p:cNvSpPr txBox="1"/>
+          <p:nvPr/>
+        </p:nvSpPr>
+        <p:spPr>
+          <a:xfrm>
+            <a:off x="11595998" y="6597228"/>
+            <a:ext cx="668887" cy="261610"/>
+          </a:xfrm>
+          <a:prstGeom prst="rect">
+            <a:avLst/>
+          </a:prstGeom>
+          <a:noFill/>
+        </p:spPr>
+        <p:txBody>
+          <a:bodyPr wrap="square" rtlCol="0">
+            <a:spAutoFit/>
+          </a:bodyPr>
+          <a:lstStyle/>
+          <a:p>
+            <a:r>
+              <a:rPr lang="en-US" sz="1100" dirty="0"/>
+              <a:t>Slide: </a:t>
+            </a:r>
+            <a:fld id="{E81B1F43-2893-C542-AE5A-0BE0AF189F44}" type="slidenum">
+              <a:rPr lang="en-US" sz="1100" smtClean="0"/>
+              <a:t>2</a:t>
+            </a:fld>
+            <a:endParaRPr lang="en-US" sz="1100" dirty="0"/>
+          </a:p>
+        </p:txBody>
+      </p:sp>
     </p:spTree>
     <p:extLst>
       <p:ext uri="{BB962C8B-B14F-4D97-AF65-F5344CB8AC3E}">
@@ -20262,34 +20352,6 @@
           <a:chExt cx="0" cy="0"/>
         </a:xfrm>
       </p:grpSpPr>
-      <p:graphicFrame>
-        <p:nvGraphicFramePr>
-          <p:cNvPr id="4" name="Diagram 3">
-            <a:extLst>
-              <a:ext uri="{FF2B5EF4-FFF2-40B4-BE49-F238E27FC236}">
-                <a16:creationId xmlns:a16="http://schemas.microsoft.com/office/drawing/2014/main" id="{76C14EC4-9FF4-B042-A877-6A39FE52BF4C}"/>
-              </a:ext>
-            </a:extLst>
-          </p:cNvPr>
-          <p:cNvGraphicFramePr/>
-          <p:nvPr>
-            <p:extLst>
-              <p:ext uri="{D42A27DB-BD31-4B8C-83A1-F6EECF244321}">
-                <p14:modId xmlns:p14="http://schemas.microsoft.com/office/powerpoint/2010/main" val="1246853625"/>
-              </p:ext>
-            </p:extLst>
-          </p:nvPr>
-        </p:nvGraphicFramePr>
-        <p:xfrm>
-          <a:off x="3330516" y="1210964"/>
-          <a:ext cx="8128000" cy="4284819"/>
-        </p:xfrm>
-        <a:graphic>
-          <a:graphicData uri="http://schemas.openxmlformats.org/drawingml/2006/diagram">
-            <dgm:relIds xmlns:dgm="http://schemas.openxmlformats.org/drawingml/2006/diagram" xmlns:r="http://schemas.openxmlformats.org/officeDocument/2006/relationships" r:dm="rId2" r:lo="rId3" r:qs="rId4" r:cs="rId5"/>
-          </a:graphicData>
-        </a:graphic>
-      </p:graphicFrame>
       <p:sp>
         <p:nvSpPr>
           <p:cNvPr id="5" name="TextBox 4">
@@ -20327,118 +20389,6 @@
       </p:sp>
       <p:pic>
         <p:nvPicPr>
-          <p:cNvPr id="7" name="Graphic 6" descr="Key">
-            <a:extLst>
-              <a:ext uri="{FF2B5EF4-FFF2-40B4-BE49-F238E27FC236}">
-                <a16:creationId xmlns:a16="http://schemas.microsoft.com/office/drawing/2014/main" id="{60D2AE77-8060-DF43-B301-544F279FAA1D}"/>
-              </a:ext>
-            </a:extLst>
-          </p:cNvPr>
-          <p:cNvPicPr>
-            <a:picLocks noChangeAspect="1"/>
-          </p:cNvPicPr>
-          <p:nvPr/>
-        </p:nvPicPr>
-        <p:blipFill>
-          <a:blip r:embed="rId7">
-            <a:extLst>
-              <a:ext uri="{96DAC541-7B7A-43D3-8B79-37D633B846F1}">
-                <asvg:svgBlip xmlns:asvg="http://schemas.microsoft.com/office/drawing/2016/SVG/main" r:embed="rId8"/>
-              </a:ext>
-            </a:extLst>
-          </a:blip>
-          <a:stretch>
-            <a:fillRect/>
-          </a:stretch>
-        </p:blipFill>
-        <p:spPr>
-          <a:xfrm>
-            <a:off x="3407438" y="1485555"/>
-            <a:ext cx="581623" cy="581623"/>
-          </a:xfrm>
-          <a:prstGeom prst="rect">
-            <a:avLst/>
-          </a:prstGeom>
-        </p:spPr>
-      </p:pic>
-      <p:pic>
-        <p:nvPicPr>
-          <p:cNvPr id="9" name="Picture 8">
-            <a:extLst>
-              <a:ext uri="{FF2B5EF4-FFF2-40B4-BE49-F238E27FC236}">
-                <a16:creationId xmlns:a16="http://schemas.microsoft.com/office/drawing/2014/main" id="{AC4694E7-DFFC-A846-8981-8B4329EF42EA}"/>
-              </a:ext>
-            </a:extLst>
-          </p:cNvPr>
-          <p:cNvPicPr>
-            <a:picLocks noChangeAspect="1"/>
-          </p:cNvPicPr>
-          <p:nvPr/>
-        </p:nvPicPr>
-        <p:blipFill>
-          <a:blip r:embed="rId9"/>
-          <a:stretch>
-            <a:fillRect/>
-          </a:stretch>
-        </p:blipFill>
-        <p:spPr>
-          <a:xfrm>
-            <a:off x="866538" y="1347400"/>
-            <a:ext cx="749300" cy="749300"/>
-          </a:xfrm>
-          <a:prstGeom prst="rect">
-            <a:avLst/>
-          </a:prstGeom>
-        </p:spPr>
-      </p:pic>
-      <p:sp>
-        <p:nvSpPr>
-          <p:cNvPr id="10" name="Right Arrow 9">
-            <a:extLst>
-              <a:ext uri="{FF2B5EF4-FFF2-40B4-BE49-F238E27FC236}">
-                <a16:creationId xmlns:a16="http://schemas.microsoft.com/office/drawing/2014/main" id="{BE6092C3-FE57-0E49-B5F4-64EEAE99218D}"/>
-              </a:ext>
-            </a:extLst>
-          </p:cNvPr>
-          <p:cNvSpPr/>
-          <p:nvPr/>
-        </p:nvSpPr>
-        <p:spPr>
-          <a:xfrm>
-            <a:off x="1787377" y="1598482"/>
-            <a:ext cx="457200" cy="247135"/>
-          </a:xfrm>
-          <a:prstGeom prst="rightArrow">
-            <a:avLst/>
-          </a:prstGeom>
-        </p:spPr>
-        <p:style>
-          <a:lnRef idx="2">
-            <a:schemeClr val="accent1">
-              <a:shade val="50000"/>
-            </a:schemeClr>
-          </a:lnRef>
-          <a:fillRef idx="1">
-            <a:schemeClr val="accent1"/>
-          </a:fillRef>
-          <a:effectRef idx="0">
-            <a:schemeClr val="accent1"/>
-          </a:effectRef>
-          <a:fontRef idx="minor">
-            <a:schemeClr val="lt1"/>
-          </a:fontRef>
-        </p:style>
-        <p:txBody>
-          <a:bodyPr rtlCol="0" anchor="ctr"/>
-          <a:lstStyle/>
-          <a:p>
-            <a:pPr algn="ctr"/>
-            <a:endParaRPr lang="en-US"/>
-          </a:p>
-        </p:txBody>
-      </p:sp>
-      <p:pic>
-        <p:nvPicPr>
           <p:cNvPr id="16" name="Picture 15">
             <a:extLst>
               <a:ext uri="{FF2B5EF4-FFF2-40B4-BE49-F238E27FC236}">
@@ -20452,7 +20402,7 @@
           <p:nvPr/>
         </p:nvPicPr>
         <p:blipFill>
-          <a:blip r:embed="rId10"/>
+          <a:blip r:embed="rId2"/>
           <a:stretch>
             <a:fillRect/>
           </a:stretch>
@@ -20475,36 +20425,6 @@
       </p:pic>
       <p:pic>
         <p:nvPicPr>
-          <p:cNvPr id="18" name="Picture 17">
-            <a:extLst>
-              <a:ext uri="{FF2B5EF4-FFF2-40B4-BE49-F238E27FC236}">
-                <a16:creationId xmlns:a16="http://schemas.microsoft.com/office/drawing/2014/main" id="{6D9AA948-FD0F-0E4D-8FAE-0EB8251E97D6}"/>
-              </a:ext>
-            </a:extLst>
-          </p:cNvPr>
-          <p:cNvPicPr>
-            <a:picLocks noChangeAspect="1"/>
-          </p:cNvPicPr>
-          <p:nvPr/>
-        </p:nvPicPr>
-        <p:blipFill>
-          <a:blip r:embed="rId11"/>
-          <a:stretch>
-            <a:fillRect/>
-          </a:stretch>
-        </p:blipFill>
-        <p:spPr>
-          <a:xfrm>
-            <a:off x="2398750" y="1347399"/>
-            <a:ext cx="749300" cy="749300"/>
-          </a:xfrm>
-          <a:prstGeom prst="rect">
-            <a:avLst/>
-          </a:prstGeom>
-        </p:spPr>
-      </p:pic>
-      <p:pic>
-        <p:nvPicPr>
           <p:cNvPr id="20" name="Picture 19">
             <a:extLst>
               <a:ext uri="{FF2B5EF4-FFF2-40B4-BE49-F238E27FC236}">
@@ -20518,7 +20438,7 @@
           <p:nvPr/>
         </p:nvPicPr>
         <p:blipFill>
-          <a:blip r:embed="rId12"/>
+          <a:blip r:embed="rId3"/>
           <a:stretch>
             <a:fillRect/>
           </a:stretch>
@@ -20548,7 +20468,7 @@
           <p:nvPr/>
         </p:nvPicPr>
         <p:blipFill>
-          <a:blip r:embed="rId10"/>
+          <a:blip r:embed="rId2"/>
           <a:stretch>
             <a:fillRect/>
           </a:stretch>
@@ -20569,52 +20489,243 @@
           </a:solidFill>
         </p:spPr>
       </p:pic>
-      <p:sp>
-        <p:nvSpPr>
-          <p:cNvPr id="22" name="Right Arrow 21">
+      <p:grpSp>
+        <p:nvGrpSpPr>
+          <p:cNvPr id="2" name="Group 1">
             <a:extLst>
               <a:ext uri="{FF2B5EF4-FFF2-40B4-BE49-F238E27FC236}">
-                <a16:creationId xmlns:a16="http://schemas.microsoft.com/office/drawing/2014/main" id="{B62E22F4-D741-C740-B70B-9015B6BE0604}"/>
+                <a16:creationId xmlns:a16="http://schemas.microsoft.com/office/drawing/2014/main" id="{DFAA7582-2312-964B-97B4-653741E24219}"/>
               </a:ext>
             </a:extLst>
           </p:cNvPr>
-          <p:cNvSpPr/>
+          <p:cNvGrpSpPr/>
           <p:nvPr/>
-        </p:nvSpPr>
-        <p:spPr>
+        </p:nvGrpSpPr>
+        <p:grpSpPr>
           <a:xfrm>
-            <a:off x="4220354" y="1598482"/>
-            <a:ext cx="457200" cy="247135"/>
+            <a:off x="866538" y="1210964"/>
+            <a:ext cx="10591978" cy="4284819"/>
+            <a:chOff x="866538" y="1210964"/>
+            <a:chExt cx="10591978" cy="4284819"/>
           </a:xfrm>
-          <a:prstGeom prst="rightArrow">
-            <a:avLst/>
-          </a:prstGeom>
-        </p:spPr>
-        <p:style>
-          <a:lnRef idx="2">
-            <a:schemeClr val="accent1">
-              <a:shade val="50000"/>
-            </a:schemeClr>
-          </a:lnRef>
-          <a:fillRef idx="1">
-            <a:schemeClr val="accent1"/>
-          </a:fillRef>
-          <a:effectRef idx="0">
-            <a:schemeClr val="accent1"/>
-          </a:effectRef>
-          <a:fontRef idx="minor">
-            <a:schemeClr val="lt1"/>
-          </a:fontRef>
-        </p:style>
-        <p:txBody>
-          <a:bodyPr rtlCol="0" anchor="ctr"/>
-          <a:lstStyle/>
-          <a:p>
-            <a:pPr algn="ctr"/>
-            <a:endParaRPr lang="en-US"/>
-          </a:p>
-        </p:txBody>
-      </p:sp>
+        </p:grpSpPr>
+        <p:graphicFrame>
+          <p:nvGraphicFramePr>
+            <p:cNvPr id="4" name="Diagram 3">
+              <a:extLst>
+                <a:ext uri="{FF2B5EF4-FFF2-40B4-BE49-F238E27FC236}">
+                  <a16:creationId xmlns:a16="http://schemas.microsoft.com/office/drawing/2014/main" id="{76C14EC4-9FF4-B042-A877-6A39FE52BF4C}"/>
+                </a:ext>
+              </a:extLst>
+            </p:cNvPr>
+            <p:cNvGraphicFramePr/>
+            <p:nvPr>
+              <p:extLst>
+                <p:ext uri="{D42A27DB-BD31-4B8C-83A1-F6EECF244321}">
+                  <p14:modId xmlns:p14="http://schemas.microsoft.com/office/powerpoint/2010/main" val="3424964285"/>
+                </p:ext>
+              </p:extLst>
+            </p:nvPr>
+          </p:nvGraphicFramePr>
+          <p:xfrm>
+            <a:off x="3330516" y="1210964"/>
+            <a:ext cx="8128000" cy="4284819"/>
+          </p:xfrm>
+          <a:graphic>
+            <a:graphicData uri="http://schemas.openxmlformats.org/drawingml/2006/diagram">
+              <dgm:relIds xmlns:dgm="http://schemas.openxmlformats.org/drawingml/2006/diagram" xmlns:r="http://schemas.openxmlformats.org/officeDocument/2006/relationships" r:dm="rId4" r:lo="rId5" r:qs="rId6" r:cs="rId7"/>
+            </a:graphicData>
+          </a:graphic>
+        </p:graphicFrame>
+        <p:pic>
+          <p:nvPicPr>
+            <p:cNvPr id="7" name="Graphic 6" descr="Key">
+              <a:extLst>
+                <a:ext uri="{FF2B5EF4-FFF2-40B4-BE49-F238E27FC236}">
+                  <a16:creationId xmlns:a16="http://schemas.microsoft.com/office/drawing/2014/main" id="{60D2AE77-8060-DF43-B301-544F279FAA1D}"/>
+                </a:ext>
+              </a:extLst>
+            </p:cNvPr>
+            <p:cNvPicPr>
+              <a:picLocks noChangeAspect="1"/>
+            </p:cNvPicPr>
+            <p:nvPr/>
+          </p:nvPicPr>
+          <p:blipFill>
+            <a:blip r:embed="rId9">
+              <a:extLst>
+                <a:ext uri="{96DAC541-7B7A-43D3-8B79-37D633B846F1}">
+                  <asvg:svgBlip xmlns:asvg="http://schemas.microsoft.com/office/drawing/2016/SVG/main" r:embed="rId10"/>
+                </a:ext>
+              </a:extLst>
+            </a:blip>
+            <a:stretch>
+              <a:fillRect/>
+            </a:stretch>
+          </p:blipFill>
+          <p:spPr>
+            <a:xfrm>
+              <a:off x="3407438" y="1485555"/>
+              <a:ext cx="581623" cy="581623"/>
+            </a:xfrm>
+            <a:prstGeom prst="rect">
+              <a:avLst/>
+            </a:prstGeom>
+          </p:spPr>
+        </p:pic>
+        <p:pic>
+          <p:nvPicPr>
+            <p:cNvPr id="9" name="Picture 8">
+              <a:extLst>
+                <a:ext uri="{FF2B5EF4-FFF2-40B4-BE49-F238E27FC236}">
+                  <a16:creationId xmlns:a16="http://schemas.microsoft.com/office/drawing/2014/main" id="{AC4694E7-DFFC-A846-8981-8B4329EF42EA}"/>
+                </a:ext>
+              </a:extLst>
+            </p:cNvPr>
+            <p:cNvPicPr>
+              <a:picLocks noChangeAspect="1"/>
+            </p:cNvPicPr>
+            <p:nvPr/>
+          </p:nvPicPr>
+          <p:blipFill>
+            <a:blip r:embed="rId11"/>
+            <a:stretch>
+              <a:fillRect/>
+            </a:stretch>
+          </p:blipFill>
+          <p:spPr>
+            <a:xfrm>
+              <a:off x="866538" y="1347400"/>
+              <a:ext cx="749300" cy="749300"/>
+            </a:xfrm>
+            <a:prstGeom prst="rect">
+              <a:avLst/>
+            </a:prstGeom>
+          </p:spPr>
+        </p:pic>
+        <p:sp>
+          <p:nvSpPr>
+            <p:cNvPr id="10" name="Right Arrow 9">
+              <a:extLst>
+                <a:ext uri="{FF2B5EF4-FFF2-40B4-BE49-F238E27FC236}">
+                  <a16:creationId xmlns:a16="http://schemas.microsoft.com/office/drawing/2014/main" id="{BE6092C3-FE57-0E49-B5F4-64EEAE99218D}"/>
+                </a:ext>
+              </a:extLst>
+            </p:cNvPr>
+            <p:cNvSpPr/>
+            <p:nvPr/>
+          </p:nvSpPr>
+          <p:spPr>
+            <a:xfrm>
+              <a:off x="1787377" y="1598482"/>
+              <a:ext cx="457200" cy="247135"/>
+            </a:xfrm>
+            <a:prstGeom prst="rightArrow">
+              <a:avLst/>
+            </a:prstGeom>
+          </p:spPr>
+          <p:style>
+            <a:lnRef idx="2">
+              <a:schemeClr val="accent1">
+                <a:shade val="50000"/>
+              </a:schemeClr>
+            </a:lnRef>
+            <a:fillRef idx="1">
+              <a:schemeClr val="accent1"/>
+            </a:fillRef>
+            <a:effectRef idx="0">
+              <a:schemeClr val="accent1"/>
+            </a:effectRef>
+            <a:fontRef idx="minor">
+              <a:schemeClr val="lt1"/>
+            </a:fontRef>
+          </p:style>
+          <p:txBody>
+            <a:bodyPr rtlCol="0" anchor="ctr"/>
+            <a:lstStyle/>
+            <a:p>
+              <a:pPr algn="ctr"/>
+              <a:endParaRPr lang="en-US"/>
+            </a:p>
+          </p:txBody>
+        </p:sp>
+        <p:pic>
+          <p:nvPicPr>
+            <p:cNvPr id="18" name="Picture 17">
+              <a:extLst>
+                <a:ext uri="{FF2B5EF4-FFF2-40B4-BE49-F238E27FC236}">
+                  <a16:creationId xmlns:a16="http://schemas.microsoft.com/office/drawing/2014/main" id="{6D9AA948-FD0F-0E4D-8FAE-0EB8251E97D6}"/>
+                </a:ext>
+              </a:extLst>
+            </p:cNvPr>
+            <p:cNvPicPr>
+              <a:picLocks noChangeAspect="1"/>
+            </p:cNvPicPr>
+            <p:nvPr/>
+          </p:nvPicPr>
+          <p:blipFill>
+            <a:blip r:embed="rId12"/>
+            <a:stretch>
+              <a:fillRect/>
+            </a:stretch>
+          </p:blipFill>
+          <p:spPr>
+            <a:xfrm>
+              <a:off x="2398750" y="1347399"/>
+              <a:ext cx="749300" cy="749300"/>
+            </a:xfrm>
+            <a:prstGeom prst="rect">
+              <a:avLst/>
+            </a:prstGeom>
+          </p:spPr>
+        </p:pic>
+        <p:sp>
+          <p:nvSpPr>
+            <p:cNvPr id="22" name="Right Arrow 21">
+              <a:extLst>
+                <a:ext uri="{FF2B5EF4-FFF2-40B4-BE49-F238E27FC236}">
+                  <a16:creationId xmlns:a16="http://schemas.microsoft.com/office/drawing/2014/main" id="{B62E22F4-D741-C740-B70B-9015B6BE0604}"/>
+                </a:ext>
+              </a:extLst>
+            </p:cNvPr>
+            <p:cNvSpPr/>
+            <p:nvPr/>
+          </p:nvSpPr>
+          <p:spPr>
+            <a:xfrm>
+              <a:off x="4220354" y="1598482"/>
+              <a:ext cx="457200" cy="247135"/>
+            </a:xfrm>
+            <a:prstGeom prst="rightArrow">
+              <a:avLst/>
+            </a:prstGeom>
+          </p:spPr>
+          <p:style>
+            <a:lnRef idx="2">
+              <a:schemeClr val="accent1">
+                <a:shade val="50000"/>
+              </a:schemeClr>
+            </a:lnRef>
+            <a:fillRef idx="1">
+              <a:schemeClr val="accent1"/>
+            </a:fillRef>
+            <a:effectRef idx="0">
+              <a:schemeClr val="accent1"/>
+            </a:effectRef>
+            <a:fontRef idx="minor">
+              <a:schemeClr val="lt1"/>
+            </a:fontRef>
+          </p:style>
+          <p:txBody>
+            <a:bodyPr rtlCol="0" anchor="ctr"/>
+            <a:lstStyle/>
+            <a:p>
+              <a:pPr algn="ctr"/>
+              <a:endParaRPr lang="en-US"/>
+            </a:p>
+          </p:txBody>
+        </p:sp>
+      </p:grpSp>
       <p:pic>
         <p:nvPicPr>
           <p:cNvPr id="23" name="Picture 22">
@@ -20645,6 +20756,46 @@
           </a:prstGeom>
         </p:spPr>
       </p:pic>
+      <p:sp>
+        <p:nvSpPr>
+          <p:cNvPr id="13" name="TextBox 12">
+            <a:extLst>
+              <a:ext uri="{FF2B5EF4-FFF2-40B4-BE49-F238E27FC236}">
+                <a16:creationId xmlns:a16="http://schemas.microsoft.com/office/drawing/2014/main" id="{64B291FC-491E-AF4F-AE79-D08CFD179AF8}"/>
+              </a:ext>
+            </a:extLst>
+          </p:cNvPr>
+          <p:cNvSpPr txBox="1"/>
+          <p:nvPr/>
+        </p:nvSpPr>
+        <p:spPr>
+          <a:xfrm>
+            <a:off x="11595998" y="6597228"/>
+            <a:ext cx="668887" cy="261610"/>
+          </a:xfrm>
+          <a:prstGeom prst="rect">
+            <a:avLst/>
+          </a:prstGeom>
+          <a:noFill/>
+        </p:spPr>
+        <p:txBody>
+          <a:bodyPr wrap="square" rtlCol="0">
+            <a:spAutoFit/>
+          </a:bodyPr>
+          <a:lstStyle/>
+          <a:p>
+            <a:r>
+              <a:rPr lang="en-US" sz="1100" dirty="0"/>
+              <a:t>Slide: </a:t>
+            </a:r>
+            <a:fld id="{E81B1F43-2893-C542-AE5A-0BE0AF189F44}" type="slidenum">
+              <a:rPr lang="en-US" sz="1100" smtClean="0"/>
+              <a:t>3</a:t>
+            </a:fld>
+            <a:endParaRPr lang="en-US" sz="1100" dirty="0"/>
+          </a:p>
+        </p:txBody>
+      </p:sp>
     </p:spTree>
     <p:extLst>
       <p:ext uri="{BB962C8B-B14F-4D97-AF65-F5344CB8AC3E}">
@@ -20903,7 +21054,7 @@
             <p:nvPr>
               <p:extLst>
                 <p:ext uri="{D42A27DB-BD31-4B8C-83A1-F6EECF244321}">
-                  <p14:modId xmlns:p14="http://schemas.microsoft.com/office/powerpoint/2010/main" val="2020025379"/>
+                  <p14:modId xmlns:p14="http://schemas.microsoft.com/office/powerpoint/2010/main" val="1187347502"/>
                 </p:ext>
               </p:extLst>
             </p:nvPr>
@@ -21069,6 +21220,46 @@
           </p:spPr>
         </p:pic>
       </p:grpSp>
+      <p:sp>
+        <p:nvSpPr>
+          <p:cNvPr id="15" name="TextBox 14">
+            <a:extLst>
+              <a:ext uri="{FF2B5EF4-FFF2-40B4-BE49-F238E27FC236}">
+                <a16:creationId xmlns:a16="http://schemas.microsoft.com/office/drawing/2014/main" id="{CAD6674F-DECA-AD49-94B6-8AFAAC5457C1}"/>
+              </a:ext>
+            </a:extLst>
+          </p:cNvPr>
+          <p:cNvSpPr txBox="1"/>
+          <p:nvPr/>
+        </p:nvSpPr>
+        <p:spPr>
+          <a:xfrm>
+            <a:off x="11595998" y="6597228"/>
+            <a:ext cx="668887" cy="261610"/>
+          </a:xfrm>
+          <a:prstGeom prst="rect">
+            <a:avLst/>
+          </a:prstGeom>
+          <a:noFill/>
+        </p:spPr>
+        <p:txBody>
+          <a:bodyPr wrap="square" rtlCol="0">
+            <a:spAutoFit/>
+          </a:bodyPr>
+          <a:lstStyle/>
+          <a:p>
+            <a:r>
+              <a:rPr lang="en-US" sz="1100" dirty="0"/>
+              <a:t>Slide: </a:t>
+            </a:r>
+            <a:fld id="{E81B1F43-2893-C542-AE5A-0BE0AF189F44}" type="slidenum">
+              <a:rPr lang="en-US" sz="1100" smtClean="0"/>
+              <a:t>4</a:t>
+            </a:fld>
+            <a:endParaRPr lang="en-US" sz="1100" dirty="0"/>
+          </a:p>
+        </p:txBody>
+      </p:sp>
     </p:spTree>
     <p:extLst>
       <p:ext uri="{BB962C8B-B14F-4D97-AF65-F5344CB8AC3E}">
@@ -21099,66 +21290,87 @@
           <a:chExt cx="0" cy="0"/>
         </a:xfrm>
       </p:grpSpPr>
-      <p:pic>
-        <p:nvPicPr>
-          <p:cNvPr id="4" name="Picture 3">
+      <p:grpSp>
+        <p:nvGrpSpPr>
+          <p:cNvPr id="2" name="Group 1">
             <a:extLst>
               <a:ext uri="{FF2B5EF4-FFF2-40B4-BE49-F238E27FC236}">
-                <a16:creationId xmlns:a16="http://schemas.microsoft.com/office/drawing/2014/main" id="{AD2E9D08-1202-7E4C-AEEE-FFCDAB305E35}"/>
+                <a16:creationId xmlns:a16="http://schemas.microsoft.com/office/drawing/2014/main" id="{FACD78DA-4D7F-D040-9AF2-288FD56A3004}"/>
               </a:ext>
             </a:extLst>
           </p:cNvPr>
-          <p:cNvPicPr>
-            <a:picLocks noChangeAspect="1"/>
-          </p:cNvPicPr>
+          <p:cNvGrpSpPr/>
           <p:nvPr/>
-        </p:nvPicPr>
-        <p:blipFill>
-          <a:blip r:embed="rId3"/>
-          <a:stretch>
-            <a:fillRect/>
-          </a:stretch>
-        </p:blipFill>
-        <p:spPr>
+        </p:nvGrpSpPr>
+        <p:grpSpPr>
           <a:xfrm>
-            <a:off x="27296" y="40944"/>
-            <a:ext cx="5773002" cy="4121624"/>
+            <a:off x="27296" y="1138917"/>
+            <a:ext cx="12151054" cy="4121624"/>
+            <a:chOff x="27296" y="40944"/>
+            <a:chExt cx="12151054" cy="4121624"/>
           </a:xfrm>
-          <a:prstGeom prst="rect">
-            <a:avLst/>
-          </a:prstGeom>
-        </p:spPr>
-      </p:pic>
-      <p:pic>
-        <p:nvPicPr>
-          <p:cNvPr id="5" name="Picture 4">
-            <a:extLst>
-              <a:ext uri="{FF2B5EF4-FFF2-40B4-BE49-F238E27FC236}">
-                <a16:creationId xmlns:a16="http://schemas.microsoft.com/office/drawing/2014/main" id="{ED28F639-6EC2-E74A-85D8-F92BF792B7F0}"/>
-              </a:ext>
-            </a:extLst>
-          </p:cNvPr>
-          <p:cNvPicPr>
-            <a:picLocks noChangeAspect="1"/>
-          </p:cNvPicPr>
-          <p:nvPr/>
-        </p:nvPicPr>
-        <p:blipFill>
-          <a:blip r:embed="rId4"/>
-          <a:stretch>
-            <a:fillRect/>
-          </a:stretch>
-        </p:blipFill>
-        <p:spPr>
-          <a:xfrm>
-            <a:off x="5800297" y="40944"/>
-            <a:ext cx="6378053" cy="4114802"/>
-          </a:xfrm>
-          <a:prstGeom prst="rect">
-            <a:avLst/>
-          </a:prstGeom>
-        </p:spPr>
-      </p:pic>
+        </p:grpSpPr>
+        <p:pic>
+          <p:nvPicPr>
+            <p:cNvPr id="4" name="Picture 3">
+              <a:extLst>
+                <a:ext uri="{FF2B5EF4-FFF2-40B4-BE49-F238E27FC236}">
+                  <a16:creationId xmlns:a16="http://schemas.microsoft.com/office/drawing/2014/main" id="{AD2E9D08-1202-7E4C-AEEE-FFCDAB305E35}"/>
+                </a:ext>
+              </a:extLst>
+            </p:cNvPr>
+            <p:cNvPicPr>
+              <a:picLocks noChangeAspect="1"/>
+            </p:cNvPicPr>
+            <p:nvPr/>
+          </p:nvPicPr>
+          <p:blipFill>
+            <a:blip r:embed="rId3"/>
+            <a:stretch>
+              <a:fillRect/>
+            </a:stretch>
+          </p:blipFill>
+          <p:spPr>
+            <a:xfrm>
+              <a:off x="27296" y="40944"/>
+              <a:ext cx="5773002" cy="4121624"/>
+            </a:xfrm>
+            <a:prstGeom prst="rect">
+              <a:avLst/>
+            </a:prstGeom>
+          </p:spPr>
+        </p:pic>
+        <p:pic>
+          <p:nvPicPr>
+            <p:cNvPr id="5" name="Picture 4">
+              <a:extLst>
+                <a:ext uri="{FF2B5EF4-FFF2-40B4-BE49-F238E27FC236}">
+                  <a16:creationId xmlns:a16="http://schemas.microsoft.com/office/drawing/2014/main" id="{ED28F639-6EC2-E74A-85D8-F92BF792B7F0}"/>
+                </a:ext>
+              </a:extLst>
+            </p:cNvPr>
+            <p:cNvPicPr>
+              <a:picLocks noChangeAspect="1"/>
+            </p:cNvPicPr>
+            <p:nvPr/>
+          </p:nvPicPr>
+          <p:blipFill>
+            <a:blip r:embed="rId4"/>
+            <a:stretch>
+              <a:fillRect/>
+            </a:stretch>
+          </p:blipFill>
+          <p:spPr>
+            <a:xfrm>
+              <a:off x="5800297" y="40944"/>
+              <a:ext cx="6378053" cy="4114802"/>
+            </a:xfrm>
+            <a:prstGeom prst="rect">
+              <a:avLst/>
+            </a:prstGeom>
+          </p:spPr>
+        </p:pic>
+      </p:grpSp>
       <p:sp>
         <p:nvSpPr>
           <p:cNvPr id="8" name="TextBox 7">
@@ -21173,8 +21385,8 @@
         </p:nvSpPr>
         <p:spPr>
           <a:xfrm>
-            <a:off x="1296537" y="4722125"/>
-            <a:ext cx="9703559" cy="1754326"/>
+            <a:off x="1387977" y="5473965"/>
+            <a:ext cx="9310503" cy="1323439"/>
           </a:xfrm>
           <a:prstGeom prst="rect">
             <a:avLst/>
@@ -21192,7 +21404,7 @@
               <a:buChar char="•"/>
             </a:pPr>
             <a:r>
-              <a:rPr lang="en-US" dirty="0">
+              <a:rPr lang="en-US" sz="1600" dirty="0">
                 <a:solidFill>
                   <a:srgbClr val="FFFFFF"/>
                 </a:solidFill>
@@ -21206,12 +21418,12 @@
               <a:buChar char="•"/>
             </a:pPr>
             <a:r>
-              <a:rPr lang="en-US" dirty="0">
+              <a:rPr lang="en-US" sz="1600" dirty="0">
                 <a:solidFill>
                   <a:srgbClr val="FFFFFF"/>
                 </a:solidFill>
               </a:rPr>
-              <a:t>Company9, Company43, Company24 have created maximum sessions with count 41, 39, 36</a:t>
+              <a:t>Company9, Company43, Company24 have created maximum sessions with count of 41, 39, 36</a:t>
             </a:r>
           </a:p>
           <a:p>
@@ -21220,7 +21432,7 @@
               <a:buChar char="•"/>
             </a:pPr>
             <a:r>
-              <a:rPr lang="en-US" dirty="0">
+              <a:rPr lang="en-US" sz="1600" dirty="0">
                 <a:solidFill>
                   <a:srgbClr val="FFFFFF"/>
                 </a:solidFill>
@@ -21234,12 +21446,12 @@
               <a:buChar char="•"/>
             </a:pPr>
             <a:r>
-              <a:rPr lang="en-US" dirty="0">
+              <a:rPr lang="en-US" sz="1600" dirty="0">
                 <a:solidFill>
                   <a:srgbClr val="FFFFFF"/>
                 </a:solidFill>
               </a:rPr>
-              <a:t>Most active customers are Company24, Company8, Company22, Company17, while </a:t>
+              <a:t>Most active customers are Company24, Company8, Company22, Company17 </a:t>
             </a:r>
           </a:p>
           <a:p>
@@ -21248,13 +21460,89 @@
               <a:buChar char="•"/>
             </a:pPr>
             <a:r>
-              <a:rPr lang="en-US" dirty="0">
+              <a:rPr lang="en-US" sz="1600" dirty="0">
                 <a:solidFill>
                   <a:srgbClr val="FFFFFF"/>
                 </a:solidFill>
               </a:rPr>
               <a:t>Company38 has is least active or has recently come to site while this customer has 14 sessions.</a:t>
             </a:r>
+          </a:p>
+        </p:txBody>
+      </p:sp>
+      <p:sp>
+        <p:nvSpPr>
+          <p:cNvPr id="3" name="TextBox 2">
+            <a:extLst>
+              <a:ext uri="{FF2B5EF4-FFF2-40B4-BE49-F238E27FC236}">
+                <a16:creationId xmlns:a16="http://schemas.microsoft.com/office/drawing/2014/main" id="{2F4C2EE9-C902-2A48-B20C-F4C86EF33CBE}"/>
+              </a:ext>
+            </a:extLst>
+          </p:cNvPr>
+          <p:cNvSpPr txBox="1"/>
+          <p:nvPr/>
+        </p:nvSpPr>
+        <p:spPr>
+          <a:xfrm>
+            <a:off x="0" y="243840"/>
+            <a:ext cx="12178350" cy="461665"/>
+          </a:xfrm>
+          <a:prstGeom prst="rect">
+            <a:avLst/>
+          </a:prstGeom>
+          <a:noFill/>
+        </p:spPr>
+        <p:txBody>
+          <a:bodyPr wrap="square" rtlCol="0">
+            <a:spAutoFit/>
+          </a:bodyPr>
+          <a:lstStyle/>
+          <a:p>
+            <a:pPr algn="ctr"/>
+            <a:r>
+              <a:rPr lang="en-US" sz="2400" b="1" dirty="0"/>
+              <a:t>Customers Overall Session Count  Vs Customers Active/Inactive Time  On Session</a:t>
+            </a:r>
+          </a:p>
+        </p:txBody>
+      </p:sp>
+      <p:sp>
+        <p:nvSpPr>
+          <p:cNvPr id="7" name="TextBox 6">
+            <a:extLst>
+              <a:ext uri="{FF2B5EF4-FFF2-40B4-BE49-F238E27FC236}">
+                <a16:creationId xmlns:a16="http://schemas.microsoft.com/office/drawing/2014/main" id="{3A570813-C466-BB42-AD92-BCAC3F893E17}"/>
+              </a:ext>
+            </a:extLst>
+          </p:cNvPr>
+          <p:cNvSpPr txBox="1"/>
+          <p:nvPr/>
+        </p:nvSpPr>
+        <p:spPr>
+          <a:xfrm>
+            <a:off x="11595998" y="6597228"/>
+            <a:ext cx="668887" cy="261610"/>
+          </a:xfrm>
+          <a:prstGeom prst="rect">
+            <a:avLst/>
+          </a:prstGeom>
+          <a:noFill/>
+        </p:spPr>
+        <p:txBody>
+          <a:bodyPr wrap="square" rtlCol="0">
+            <a:spAutoFit/>
+          </a:bodyPr>
+          <a:lstStyle/>
+          <a:p>
+            <a:r>
+              <a:rPr lang="en-US" sz="1100" dirty="0"/>
+              <a:t>Slide: </a:t>
+            </a:r>
+            <a:fld id="{E81B1F43-2893-C542-AE5A-0BE0AF189F44}" type="slidenum">
+              <a:rPr lang="en-US" sz="1100" smtClean="0"/>
+              <a:t>5</a:t>
+            </a:fld>
+            <a:endParaRPr lang="en-US" sz="1100" dirty="0"/>
           </a:p>
         </p:txBody>
       </p:sp>
@@ -21363,13 +21651,13 @@
         </p:spPr>
         <p:txBody>
           <a:bodyPr vert="horz" lIns="91440" tIns="45720" rIns="91440" bIns="45720" rtlCol="0" anchor="ctr">
-            <a:normAutofit fontScale="90000"/>
+            <a:noAutofit/>
           </a:bodyPr>
           <a:lstStyle/>
           <a:p>
             <a:pPr algn="ctr"/>
             <a:br>
-              <a:rPr lang="en-US" sz="2600" b="1" kern="1200" dirty="0">
+              <a:rPr lang="en-US" sz="2200" b="1" kern="1200" dirty="0">
                 <a:solidFill>
                   <a:srgbClr val="FFFFFF"/>
                 </a:solidFill>
@@ -21379,7 +21667,7 @@
               </a:rPr>
             </a:br>
             <a:r>
-              <a:rPr lang="en-US" sz="2600" b="1" kern="1200" dirty="0">
+              <a:rPr lang="en-US" sz="2200" b="1" kern="1200" dirty="0">
                 <a:solidFill>
                   <a:schemeClr val="bg1"/>
                 </a:solidFill>
@@ -21387,10 +21675,29 @@
                 <a:ea typeface="+mj-ea"/>
                 <a:cs typeface="+mj-cs"/>
               </a:rPr>
-              <a:t>Data Package is most </a:t>
+              <a:t>Data Package Is </a:t>
             </a:r>
             <a:r>
-              <a:rPr lang="en-US" sz="2600" b="1" dirty="0">
+              <a:rPr lang="en-US" sz="2200" b="1" dirty="0">
+                <a:solidFill>
+                  <a:schemeClr val="bg1"/>
+                </a:solidFill>
+              </a:rPr>
+              <a:t>M</a:t>
+            </a:r>
+            <a:r>
+              <a:rPr lang="en-US" sz="2200" b="1" kern="1200" dirty="0">
+                <a:solidFill>
+                  <a:schemeClr val="bg1"/>
+                </a:solidFill>
+                <a:latin typeface="+mj-lt"/>
+                <a:ea typeface="+mj-ea"/>
+                <a:cs typeface="+mj-cs"/>
+              </a:rPr>
+              <a:t>ost </a:t>
+            </a:r>
+            <a:r>
+              <a:rPr lang="en-US" sz="2200" b="1" dirty="0">
                 <a:solidFill>
                   <a:schemeClr val="bg1"/>
                 </a:solidFill>
@@ -21398,7 +21705,7 @@
               <a:t>P</a:t>
             </a:r>
             <a:r>
-              <a:rPr lang="en-US" sz="2600" b="1" kern="1200" dirty="0">
+              <a:rPr lang="en-US" sz="2200" b="1" kern="1200" dirty="0">
                 <a:solidFill>
                   <a:schemeClr val="bg1"/>
                 </a:solidFill>
@@ -21406,10 +21713,67 @@
                 <a:ea typeface="+mj-ea"/>
                 <a:cs typeface="+mj-cs"/>
               </a:rPr>
-              <a:t>opular Service Overall as well as among Active Customers</a:t>
+              <a:t>opular Service Overall As </a:t>
+            </a:r>
+            <a:r>
+              <a:rPr lang="en-US" sz="2200" b="1" dirty="0">
+                <a:solidFill>
+                  <a:schemeClr val="bg1"/>
+                </a:solidFill>
+              </a:rPr>
+              <a:t>W</a:t>
+            </a:r>
+            <a:r>
+              <a:rPr lang="en-US" sz="2200" b="1" kern="1200" dirty="0">
+                <a:solidFill>
+                  <a:schemeClr val="bg1"/>
+                </a:solidFill>
+                <a:latin typeface="+mj-lt"/>
+                <a:ea typeface="+mj-ea"/>
+                <a:cs typeface="+mj-cs"/>
+              </a:rPr>
+              <a:t>ell </a:t>
+            </a:r>
+            <a:r>
+              <a:rPr lang="en-US" sz="2200" b="1" dirty="0">
+                <a:solidFill>
+                  <a:schemeClr val="bg1"/>
+                </a:solidFill>
+              </a:rPr>
+              <a:t>A</a:t>
+            </a:r>
+            <a:r>
+              <a:rPr lang="en-US" sz="2200" b="1" kern="1200" dirty="0">
+                <a:solidFill>
+                  <a:schemeClr val="bg1"/>
+                </a:solidFill>
+                <a:latin typeface="+mj-lt"/>
+                <a:ea typeface="+mj-ea"/>
+                <a:cs typeface="+mj-cs"/>
+              </a:rPr>
+              <a:t>s </a:t>
+            </a:r>
+            <a:r>
+              <a:rPr lang="en-US" sz="2200" b="1" dirty="0">
+                <a:solidFill>
+                  <a:schemeClr val="bg1"/>
+                </a:solidFill>
+              </a:rPr>
+              <a:t>A</a:t>
+            </a:r>
+            <a:r>
+              <a:rPr lang="en-US" sz="2200" b="1" kern="1200" dirty="0">
+                <a:solidFill>
+                  <a:schemeClr val="bg1"/>
+                </a:solidFill>
+                <a:latin typeface="+mj-lt"/>
+                <a:ea typeface="+mj-ea"/>
+                <a:cs typeface="+mj-cs"/>
+              </a:rPr>
+              <a:t>mong Active Customers</a:t>
             </a:r>
             <a:br>
-              <a:rPr lang="en-US" sz="2600" b="1" kern="1200" dirty="0">
+              <a:rPr lang="en-US" sz="2200" b="1" kern="1200" dirty="0">
                 <a:solidFill>
                   <a:schemeClr val="bg1"/>
                 </a:solidFill>
@@ -21418,7 +21782,7 @@
                 <a:cs typeface="+mj-cs"/>
               </a:rPr>
             </a:br>
-            <a:endParaRPr lang="en-US" sz="2600" b="1" kern="1200" dirty="0">
+            <a:endParaRPr lang="en-US" sz="2200" b="1" kern="1200" dirty="0">
               <a:solidFill>
                 <a:schemeClr val="bg1"/>
               </a:solidFill>
@@ -21429,66 +21793,208 @@
           </a:p>
         </p:txBody>
       </p:sp>
-      <p:pic>
-        <p:nvPicPr>
-          <p:cNvPr id="15" name="Picture 14">
+      <p:grpSp>
+        <p:nvGrpSpPr>
+          <p:cNvPr id="2" name="Group 1">
             <a:extLst>
               <a:ext uri="{FF2B5EF4-FFF2-40B4-BE49-F238E27FC236}">
-                <a16:creationId xmlns:a16="http://schemas.microsoft.com/office/drawing/2014/main" id="{06A31B06-5420-D844-80EE-BF227F512E08}"/>
+                <a16:creationId xmlns:a16="http://schemas.microsoft.com/office/drawing/2014/main" id="{BEBF1AF1-C5B9-5F41-AB6D-616D67E97A23}"/>
               </a:ext>
             </a:extLst>
           </p:cNvPr>
-          <p:cNvPicPr>
-            <a:picLocks noChangeAspect="1"/>
-          </p:cNvPicPr>
+          <p:cNvGrpSpPr/>
           <p:nvPr/>
-        </p:nvPicPr>
-        <p:blipFill>
-          <a:blip r:embed="rId2"/>
-          <a:stretch>
-            <a:fillRect/>
-          </a:stretch>
-        </p:blipFill>
+        </p:nvGrpSpPr>
+        <p:grpSpPr>
+          <a:xfrm>
+            <a:off x="30784" y="2662143"/>
+            <a:ext cx="12064883" cy="4161490"/>
+            <a:chOff x="30784" y="2662143"/>
+            <a:chExt cx="12064883" cy="4161490"/>
+          </a:xfrm>
+        </p:grpSpPr>
+        <p:pic>
+          <p:nvPicPr>
+            <p:cNvPr id="15" name="Picture 14">
+              <a:extLst>
+                <a:ext uri="{FF2B5EF4-FFF2-40B4-BE49-F238E27FC236}">
+                  <a16:creationId xmlns:a16="http://schemas.microsoft.com/office/drawing/2014/main" id="{06A31B06-5420-D844-80EE-BF227F512E08}"/>
+                </a:ext>
+              </a:extLst>
+            </p:cNvPr>
+            <p:cNvPicPr>
+              <a:picLocks noChangeAspect="1"/>
+            </p:cNvPicPr>
+            <p:nvPr/>
+          </p:nvPicPr>
+          <p:blipFill>
+            <a:blip r:embed="rId2"/>
+            <a:stretch>
+              <a:fillRect/>
+            </a:stretch>
+          </p:blipFill>
+          <p:spPr>
+            <a:xfrm>
+              <a:off x="5773127" y="2662143"/>
+              <a:ext cx="6322540" cy="4161490"/>
+            </a:xfrm>
+            <a:prstGeom prst="rect">
+              <a:avLst/>
+            </a:prstGeom>
+          </p:spPr>
+        </p:pic>
+        <p:pic>
+          <p:nvPicPr>
+            <p:cNvPr id="20" name="Picture 19">
+              <a:extLst>
+                <a:ext uri="{FF2B5EF4-FFF2-40B4-BE49-F238E27FC236}">
+                  <a16:creationId xmlns:a16="http://schemas.microsoft.com/office/drawing/2014/main" id="{E21C2286-C481-5B4E-9B55-0FB1AF8567FD}"/>
+                </a:ext>
+              </a:extLst>
+            </p:cNvPr>
+            <p:cNvPicPr>
+              <a:picLocks noChangeAspect="1"/>
+            </p:cNvPicPr>
+            <p:nvPr/>
+          </p:nvPicPr>
+          <p:blipFill>
+            <a:blip r:embed="rId3"/>
+            <a:stretch>
+              <a:fillRect/>
+            </a:stretch>
+          </p:blipFill>
+          <p:spPr>
+            <a:xfrm>
+              <a:off x="30784" y="2662143"/>
+              <a:ext cx="5732183" cy="4161490"/>
+            </a:xfrm>
+            <a:prstGeom prst="rect">
+              <a:avLst/>
+            </a:prstGeom>
+          </p:spPr>
+        </p:pic>
+      </p:grpSp>
+      <p:sp>
+        <p:nvSpPr>
+          <p:cNvPr id="3" name="TextBox 2">
+            <a:extLst>
+              <a:ext uri="{FF2B5EF4-FFF2-40B4-BE49-F238E27FC236}">
+                <a16:creationId xmlns:a16="http://schemas.microsoft.com/office/drawing/2014/main" id="{C8D6462A-7CEE-5E4B-918A-5BAFE9642BF1}"/>
+              </a:ext>
+            </a:extLst>
+          </p:cNvPr>
+          <p:cNvSpPr txBox="1"/>
+          <p:nvPr/>
+        </p:nvSpPr>
         <p:spPr>
           <a:xfrm>
-            <a:off x="5773127" y="2641823"/>
-            <a:ext cx="6322540" cy="4161490"/>
+            <a:off x="835495" y="356020"/>
+            <a:ext cx="3165661" cy="400110"/>
+          </a:xfrm>
+          <a:prstGeom prst="rect">
+            <a:avLst/>
+          </a:prstGeom>
+          <a:noFill/>
+        </p:spPr>
+        <p:txBody>
+          <a:bodyPr wrap="square" rtlCol="0">
+            <a:spAutoFit/>
+          </a:bodyPr>
+          <a:lstStyle/>
+          <a:p>
+            <a:r>
+              <a:rPr lang="en-US" sz="2000" dirty="0"/>
+              <a:t>Most Popular Service Overall</a:t>
+            </a:r>
+          </a:p>
+        </p:txBody>
+      </p:sp>
+      <p:sp>
+        <p:nvSpPr>
+          <p:cNvPr id="4" name="Rectangle 3">
+            <a:extLst>
+              <a:ext uri="{FF2B5EF4-FFF2-40B4-BE49-F238E27FC236}">
+                <a16:creationId xmlns:a16="http://schemas.microsoft.com/office/drawing/2014/main" id="{7E11FA38-DC8A-0E4B-B25A-8477069C56DE}"/>
+              </a:ext>
+            </a:extLst>
+          </p:cNvPr>
+          <p:cNvSpPr/>
+          <p:nvPr/>
+        </p:nvSpPr>
+        <p:spPr>
+          <a:xfrm>
+            <a:off x="7558220" y="356020"/>
+            <a:ext cx="4568302" cy="400110"/>
           </a:xfrm>
           <a:prstGeom prst="rect">
             <a:avLst/>
           </a:prstGeom>
         </p:spPr>
-      </p:pic>
-      <p:pic>
-        <p:nvPicPr>
-          <p:cNvPr id="20" name="Picture 19">
+        <p:txBody>
+          <a:bodyPr wrap="none">
+            <a:spAutoFit/>
+          </a:bodyPr>
+          <a:lstStyle/>
+          <a:p>
+            <a:r>
+              <a:rPr lang="en-US" sz="2000" dirty="0"/>
+              <a:t>Popular Services Among Active Customers</a:t>
+            </a:r>
+          </a:p>
+        </p:txBody>
+      </p:sp>
+      <p:sp>
+        <p:nvSpPr>
+          <p:cNvPr id="9" name="TextBox 8">
             <a:extLst>
               <a:ext uri="{FF2B5EF4-FFF2-40B4-BE49-F238E27FC236}">
-                <a16:creationId xmlns:a16="http://schemas.microsoft.com/office/drawing/2014/main" id="{E21C2286-C481-5B4E-9B55-0FB1AF8567FD}"/>
+                <a16:creationId xmlns:a16="http://schemas.microsoft.com/office/drawing/2014/main" id="{A9C2FB6D-E4F6-094E-B9AF-3B0F92567432}"/>
               </a:ext>
             </a:extLst>
           </p:cNvPr>
-          <p:cNvPicPr>
-            <a:picLocks noChangeAspect="1"/>
-          </p:cNvPicPr>
+          <p:cNvSpPr txBox="1"/>
           <p:nvPr/>
-        </p:nvPicPr>
-        <p:blipFill>
-          <a:blip r:embed="rId3"/>
-          <a:stretch>
-            <a:fillRect/>
-          </a:stretch>
-        </p:blipFill>
+        </p:nvSpPr>
         <p:spPr>
           <a:xfrm>
-            <a:off x="40944" y="2641823"/>
-            <a:ext cx="5732183" cy="4161490"/>
+            <a:off x="11545198" y="6617548"/>
+            <a:ext cx="668887" cy="261610"/>
           </a:xfrm>
           <a:prstGeom prst="rect">
             <a:avLst/>
           </a:prstGeom>
+          <a:noFill/>
         </p:spPr>
-      </p:pic>
+        <p:txBody>
+          <a:bodyPr wrap="square" rtlCol="0">
+            <a:spAutoFit/>
+          </a:bodyPr>
+          <a:lstStyle/>
+          <a:p>
+            <a:r>
+              <a:rPr lang="en-US" sz="1100" dirty="0">
+                <a:solidFill>
+                  <a:schemeClr val="bg1"/>
+                </a:solidFill>
+              </a:rPr>
+              <a:t>Slide: </a:t>
+            </a:r>
+            <a:fld id="{E81B1F43-2893-C542-AE5A-0BE0AF189F44}" type="slidenum">
+              <a:rPr lang="en-US" sz="1100" smtClean="0">
+                <a:solidFill>
+                  <a:schemeClr val="bg1"/>
+                </a:solidFill>
+              </a:rPr>
+              <a:t>6</a:t>
+            </a:fld>
+            <a:endParaRPr lang="en-US" sz="1100" dirty="0">
+              <a:solidFill>
+                <a:schemeClr val="bg1"/>
+              </a:solidFill>
+            </a:endParaRPr>
+          </a:p>
+        </p:txBody>
+      </p:sp>
     </p:spTree>
     <p:extLst>
       <p:ext uri="{BB962C8B-B14F-4D97-AF65-F5344CB8AC3E}">
@@ -21611,6 +22117,94 @@
           </a:p>
         </p:txBody>
       </p:sp>
+      <p:sp>
+        <p:nvSpPr>
+          <p:cNvPr id="2" name="TextBox 1">
+            <a:extLst>
+              <a:ext uri="{FF2B5EF4-FFF2-40B4-BE49-F238E27FC236}">
+                <a16:creationId xmlns:a16="http://schemas.microsoft.com/office/drawing/2014/main" id="{38532D41-DFB6-FD45-A9D0-541BB3ECE9F5}"/>
+              </a:ext>
+            </a:extLst>
+          </p:cNvPr>
+          <p:cNvSpPr txBox="1"/>
+          <p:nvPr/>
+        </p:nvSpPr>
+        <p:spPr>
+          <a:xfrm>
+            <a:off x="0" y="243840"/>
+            <a:ext cx="3513860" cy="523220"/>
+          </a:xfrm>
+          <a:prstGeom prst="rect">
+            <a:avLst/>
+          </a:prstGeom>
+          <a:noFill/>
+        </p:spPr>
+        <p:txBody>
+          <a:bodyPr wrap="square" rtlCol="0">
+            <a:spAutoFit/>
+          </a:bodyPr>
+          <a:lstStyle/>
+          <a:p>
+            <a:pPr algn="ctr"/>
+            <a:r>
+              <a:rPr lang="en-US" sz="2800" dirty="0"/>
+              <a:t>Most Popular Browser</a:t>
+            </a:r>
+          </a:p>
+        </p:txBody>
+      </p:sp>
+      <p:sp>
+        <p:nvSpPr>
+          <p:cNvPr id="7" name="TextBox 6">
+            <a:extLst>
+              <a:ext uri="{FF2B5EF4-FFF2-40B4-BE49-F238E27FC236}">
+                <a16:creationId xmlns:a16="http://schemas.microsoft.com/office/drawing/2014/main" id="{4087052C-5A22-FA4F-8B64-BD128CBA62B4}"/>
+              </a:ext>
+            </a:extLst>
+          </p:cNvPr>
+          <p:cNvSpPr txBox="1"/>
+          <p:nvPr/>
+        </p:nvSpPr>
+        <p:spPr>
+          <a:xfrm>
+            <a:off x="11524878" y="6597228"/>
+            <a:ext cx="668887" cy="261610"/>
+          </a:xfrm>
+          <a:prstGeom prst="rect">
+            <a:avLst/>
+          </a:prstGeom>
+          <a:noFill/>
+        </p:spPr>
+        <p:txBody>
+          <a:bodyPr wrap="square" rtlCol="0">
+            <a:spAutoFit/>
+          </a:bodyPr>
+          <a:lstStyle/>
+          <a:p>
+            <a:r>
+              <a:rPr lang="en-US" sz="1100" dirty="0">
+                <a:solidFill>
+                  <a:schemeClr val="bg1"/>
+                </a:solidFill>
+              </a:rPr>
+              <a:t>Slide: </a:t>
+            </a:r>
+            <a:fld id="{E81B1F43-2893-C542-AE5A-0BE0AF189F44}" type="slidenum">
+              <a:rPr lang="en-US" sz="1100" smtClean="0">
+                <a:solidFill>
+                  <a:schemeClr val="bg1"/>
+                </a:solidFill>
+              </a:rPr>
+              <a:t>7</a:t>
+            </a:fld>
+            <a:endParaRPr lang="en-US" sz="1100" dirty="0">
+              <a:solidFill>
+                <a:schemeClr val="bg1"/>
+              </a:solidFill>
+            </a:endParaRPr>
+          </a:p>
+        </p:txBody>
+      </p:sp>
     </p:spTree>
     <p:extLst>
       <p:ext uri="{BB962C8B-B14F-4D97-AF65-F5344CB8AC3E}">
@@ -21663,7 +22257,7 @@
         </p:blipFill>
         <p:spPr>
           <a:xfrm>
-            <a:off x="3578651" y="3134531"/>
+            <a:off x="3578651" y="3551091"/>
             <a:ext cx="4519252" cy="2515643"/>
           </a:xfrm>
           <a:prstGeom prst="rect">
@@ -21689,8 +22283,8 @@
         </p:nvSpPr>
         <p:spPr>
           <a:xfrm>
-            <a:off x="933734" y="490727"/>
-            <a:ext cx="10515600" cy="1920526"/>
+            <a:off x="1391427" y="1482149"/>
+            <a:ext cx="9388333" cy="1588127"/>
           </a:xfrm>
           <a:prstGeom prst="rect">
             <a:avLst/>
@@ -21704,15 +22298,15 @@
           <a:lstStyle/>
           <a:p>
             <a:r>
-              <a:rPr lang="en-US" dirty="0">
+              <a:rPr lang="en-US" sz="3600" dirty="0">
                 <a:solidFill>
                   <a:srgbClr val="FFC000"/>
                 </a:solidFill>
               </a:rPr>
-              <a:t>Most Popular Devices among customers is </a:t>
+              <a:t>Most popular device among customers is </a:t>
             </a:r>
             <a:r>
-              <a:rPr lang="en-US" b="1" dirty="0">
+              <a:rPr lang="en-US" sz="3600" b="1" dirty="0">
                 <a:solidFill>
                   <a:srgbClr val="FFC000"/>
                 </a:solidFill>
@@ -21720,7 +22314,7 @@
               <a:t>Desktop</a:t>
             </a:r>
             <a:r>
-              <a:rPr lang="en-US" dirty="0">
+              <a:rPr lang="en-US" sz="3600" dirty="0">
                 <a:solidFill>
                   <a:srgbClr val="FFC000"/>
                 </a:solidFill>
@@ -21728,13 +22322,89 @@
               <a:t> </a:t>
             </a:r>
             <a:r>
-              <a:rPr lang="en-US" b="1" dirty="0">
+              <a:rPr lang="en-US" sz="3600" b="1" dirty="0">
                 <a:solidFill>
                   <a:srgbClr val="FFC000"/>
                 </a:solidFill>
               </a:rPr>
-              <a:t>(53848 Users) which is 99% user base is using our services through Desktop.</a:t>
+              <a:t>(53848 Users) with 99% user base using our services through Desktop.</a:t>
             </a:r>
+          </a:p>
+        </p:txBody>
+      </p:sp>
+      <p:sp>
+        <p:nvSpPr>
+          <p:cNvPr id="2" name="TextBox 1">
+            <a:extLst>
+              <a:ext uri="{FF2B5EF4-FFF2-40B4-BE49-F238E27FC236}">
+                <a16:creationId xmlns:a16="http://schemas.microsoft.com/office/drawing/2014/main" id="{811698A1-8E18-5640-9D89-8C121A4A8851}"/>
+              </a:ext>
+            </a:extLst>
+          </p:cNvPr>
+          <p:cNvSpPr txBox="1"/>
+          <p:nvPr/>
+        </p:nvSpPr>
+        <p:spPr>
+          <a:xfrm>
+            <a:off x="0" y="416560"/>
+            <a:ext cx="12192000" cy="584775"/>
+          </a:xfrm>
+          <a:prstGeom prst="rect">
+            <a:avLst/>
+          </a:prstGeom>
+          <a:noFill/>
+        </p:spPr>
+        <p:txBody>
+          <a:bodyPr wrap="square" rtlCol="0">
+            <a:spAutoFit/>
+          </a:bodyPr>
+          <a:lstStyle/>
+          <a:p>
+            <a:pPr algn="ctr"/>
+            <a:r>
+              <a:rPr lang="en-US" sz="3200" dirty="0"/>
+              <a:t>Most Popular Devices</a:t>
+            </a:r>
+          </a:p>
+        </p:txBody>
+      </p:sp>
+      <p:sp>
+        <p:nvSpPr>
+          <p:cNvPr id="6" name="TextBox 5">
+            <a:extLst>
+              <a:ext uri="{FF2B5EF4-FFF2-40B4-BE49-F238E27FC236}">
+                <a16:creationId xmlns:a16="http://schemas.microsoft.com/office/drawing/2014/main" id="{4E9D52E1-43C7-3E4F-A9CC-A66C552A4DF6}"/>
+              </a:ext>
+            </a:extLst>
+          </p:cNvPr>
+          <p:cNvSpPr txBox="1"/>
+          <p:nvPr/>
+        </p:nvSpPr>
+        <p:spPr>
+          <a:xfrm>
+            <a:off x="11595998" y="6597228"/>
+            <a:ext cx="668887" cy="261610"/>
+          </a:xfrm>
+          <a:prstGeom prst="rect">
+            <a:avLst/>
+          </a:prstGeom>
+          <a:noFill/>
+        </p:spPr>
+        <p:txBody>
+          <a:bodyPr wrap="square" rtlCol="0">
+            <a:spAutoFit/>
+          </a:bodyPr>
+          <a:lstStyle/>
+          <a:p>
+            <a:r>
+              <a:rPr lang="en-US" sz="1100" dirty="0"/>
+              <a:t>Slide: </a:t>
+            </a:r>
+            <a:fld id="{E81B1F43-2893-C542-AE5A-0BE0AF189F44}" type="slidenum">
+              <a:rPr lang="en-US" sz="1100" smtClean="0"/>
+              <a:t>8</a:t>
+            </a:fld>
+            <a:endParaRPr lang="en-US" sz="1100" dirty="0"/>
           </a:p>
         </p:txBody>
       </p:sp>
@@ -21912,6 +22582,82 @@
           </a:prstGeom>
         </p:spPr>
       </p:pic>
+      <p:sp>
+        <p:nvSpPr>
+          <p:cNvPr id="4" name="TextBox 3">
+            <a:extLst>
+              <a:ext uri="{FF2B5EF4-FFF2-40B4-BE49-F238E27FC236}">
+                <a16:creationId xmlns:a16="http://schemas.microsoft.com/office/drawing/2014/main" id="{EF8FCC87-628B-0B4D-8A0B-D3E55896E5A7}"/>
+              </a:ext>
+            </a:extLst>
+          </p:cNvPr>
+          <p:cNvSpPr txBox="1"/>
+          <p:nvPr/>
+        </p:nvSpPr>
+        <p:spPr>
+          <a:xfrm>
+            <a:off x="0" y="416560"/>
+            <a:ext cx="4267200" cy="584775"/>
+          </a:xfrm>
+          <a:prstGeom prst="rect">
+            <a:avLst/>
+          </a:prstGeom>
+          <a:noFill/>
+        </p:spPr>
+        <p:txBody>
+          <a:bodyPr wrap="square" rtlCol="0">
+            <a:spAutoFit/>
+          </a:bodyPr>
+          <a:lstStyle/>
+          <a:p>
+            <a:pPr algn="ctr"/>
+            <a:r>
+              <a:rPr lang="en-US" sz="3200" dirty="0"/>
+              <a:t>Top Visited Page</a:t>
+            </a:r>
+          </a:p>
+        </p:txBody>
+      </p:sp>
+      <p:sp>
+        <p:nvSpPr>
+          <p:cNvPr id="5" name="TextBox 4">
+            <a:extLst>
+              <a:ext uri="{FF2B5EF4-FFF2-40B4-BE49-F238E27FC236}">
+                <a16:creationId xmlns:a16="http://schemas.microsoft.com/office/drawing/2014/main" id="{71123CAF-6A94-A340-B931-CF6DB7EE06CE}"/>
+              </a:ext>
+            </a:extLst>
+          </p:cNvPr>
+          <p:cNvSpPr txBox="1"/>
+          <p:nvPr/>
+        </p:nvSpPr>
+        <p:spPr>
+          <a:xfrm>
+            <a:off x="11595998" y="6597228"/>
+            <a:ext cx="668887" cy="261610"/>
+          </a:xfrm>
+          <a:prstGeom prst="rect">
+            <a:avLst/>
+          </a:prstGeom>
+          <a:noFill/>
+        </p:spPr>
+        <p:txBody>
+          <a:bodyPr wrap="square" rtlCol="0">
+            <a:spAutoFit/>
+          </a:bodyPr>
+          <a:lstStyle/>
+          <a:p>
+            <a:r>
+              <a:rPr lang="en-US" sz="1100" dirty="0"/>
+              <a:t>Slide: </a:t>
+            </a:r>
+            <a:fld id="{E81B1F43-2893-C542-AE5A-0BE0AF189F44}" type="slidenum">
+              <a:rPr lang="en-US" sz="1100" smtClean="0"/>
+              <a:t>9</a:t>
+            </a:fld>
+            <a:endParaRPr lang="en-US" sz="1100" dirty="0"/>
+          </a:p>
+        </p:txBody>
+      </p:sp>
     </p:spTree>
     <p:extLst>
       <p:ext uri="{BB962C8B-B14F-4D97-AF65-F5344CB8AC3E}">

</xml_diff>